<commit_message>
Updated presentation (english diagrams)
</commit_message>
<xml_diff>
--- a/kolloquium/TemplateSlides2016.pptx
+++ b/kolloquium/TemplateSlides2016.pptx
@@ -11,20 +11,20 @@
     <p:handoutMasterId r:id="rId20"/>
   </p:handoutMasterIdLst>
   <p:sldIdLst>
-    <p:sldId id="479" r:id="rId2"/>
-    <p:sldId id="682" r:id="rId3"/>
-    <p:sldId id="669" r:id="rId4"/>
-    <p:sldId id="684" r:id="rId5"/>
-    <p:sldId id="683" r:id="rId6"/>
-    <p:sldId id="672" r:id="rId7"/>
-    <p:sldId id="673" r:id="rId8"/>
-    <p:sldId id="674" r:id="rId9"/>
-    <p:sldId id="685" r:id="rId10"/>
-    <p:sldId id="677" r:id="rId11"/>
-    <p:sldId id="681" r:id="rId12"/>
-    <p:sldId id="678" r:id="rId13"/>
-    <p:sldId id="679" r:id="rId14"/>
-    <p:sldId id="680" r:id="rId15"/>
+    <p:sldId id="682" r:id="rId2"/>
+    <p:sldId id="669" r:id="rId3"/>
+    <p:sldId id="684" r:id="rId4"/>
+    <p:sldId id="683" r:id="rId5"/>
+    <p:sldId id="672" r:id="rId6"/>
+    <p:sldId id="673" r:id="rId7"/>
+    <p:sldId id="674" r:id="rId8"/>
+    <p:sldId id="685" r:id="rId9"/>
+    <p:sldId id="677" r:id="rId10"/>
+    <p:sldId id="681" r:id="rId11"/>
+    <p:sldId id="678" r:id="rId12"/>
+    <p:sldId id="679" r:id="rId13"/>
+    <p:sldId id="680" r:id="rId14"/>
+    <p:sldId id="479" r:id="rId15"/>
     <p:sldId id="671" r:id="rId16"/>
     <p:sldId id="675" r:id="rId17"/>
     <p:sldId id="676" r:id="rId18"/>
@@ -246,11 +246,11 @@
           <c:showBubbleSize val="0"/>
         </c:dLbls>
         <c:gapWidth val="75"/>
-        <c:axId val="43240448"/>
-        <c:axId val="43242240"/>
+        <c:axId val="34816768"/>
+        <c:axId val="34818304"/>
       </c:barChart>
       <c:catAx>
-        <c:axId val="43240448"/>
+        <c:axId val="34816768"/>
         <c:scaling>
           <c:orientation val="minMax"/>
         </c:scaling>
@@ -269,7 +269,7 @@
             <a:endParaRPr lang="de-DE"/>
           </a:p>
         </c:txPr>
-        <c:crossAx val="43242240"/>
+        <c:crossAx val="34818304"/>
         <c:crosses val="autoZero"/>
         <c:auto val="1"/>
         <c:lblAlgn val="ctr"/>
@@ -277,7 +277,7 @@
         <c:noMultiLvlLbl val="0"/>
       </c:catAx>
       <c:valAx>
-        <c:axId val="43242240"/>
+        <c:axId val="34818304"/>
         <c:scaling>
           <c:orientation val="minMax"/>
         </c:scaling>
@@ -314,7 +314,7 @@
         <c:majorTickMark val="none"/>
         <c:minorTickMark val="none"/>
         <c:tickLblPos val="nextTo"/>
-        <c:crossAx val="43240448"/>
+        <c:crossAx val="34816768"/>
         <c:crosses val="autoZero"/>
         <c:crossBetween val="between"/>
       </c:valAx>
@@ -1010,7 +1010,7 @@
               <a:rPr lang="de-DE" smtClean="0">
                 <a:latin typeface="Calibri"/>
               </a:rPr>
-              <a:t>18.03.2018</a:t>
+              <a:t>19.03.2018</a:t>
             </a:fld>
             <a:endParaRPr lang="de-DE" dirty="0">
               <a:latin typeface="Calibri"/>
@@ -1274,7 +1274,7 @@
               </a14:hiddenFill>
             </a:ext>
             <a:ext uri="{FAA26D3D-D897-4be2-8F04-BA451C77F1D7}">
-              <ma14:placeholderFlag xmlns="" xmlns:ma14="http://schemas.microsoft.com/office/mac/drawingml/2011/main" val="1"/>
+              <ma14:placeholderFlag xmlns:ma14="http://schemas.microsoft.com/office/mac/drawingml/2011/main" xmlns="" val="1"/>
             </a:ext>
           </a:extLst>
         </p:spPr>
@@ -1875,246 +1875,211 @@
       </p:grpSpPr>
       <p:sp>
         <p:nvSpPr>
-          <p:cNvPr id="6145" name="Rectangle 7"/>
+          <p:cNvPr id="2" name="Folienbildplatzhalter 1"/>
           <p:cNvSpPr>
-            <a:spLocks noGrp="1" noChangeArrowheads="1"/>
-          </p:cNvSpPr>
-          <p:nvPr>
-            <p:ph type="sldNum" sz="quarter" idx="5"/>
-          </p:nvPr>
-        </p:nvSpPr>
-        <p:spPr>
-          <a:noFill/>
-          <a:ln/>
-          <a:extLst>
-            <a:ext uri="{909E8E84-426E-40DD-AFC4-6F175D3DCCD1}">
-              <a14:hiddenFill xmlns:a14="http://schemas.microsoft.com/office/drawing/2010/main">
-                <a:solidFill>
-                  <a:srgbClr val="FFFFFF"/>
-                </a:solidFill>
-              </a14:hiddenFill>
-            </a:ext>
-            <a:ext uri="{91240B29-F687-4F45-9708-019B960494DF}">
-              <a14:hiddenLine xmlns:a14="http://schemas.microsoft.com/office/drawing/2010/main" w="9525">
-                <a:solidFill>
-                  <a:srgbClr val="000000"/>
-                </a:solidFill>
-                <a:miter lim="800000"/>
-                <a:headEnd/>
-                <a:tailEnd/>
-              </a14:hiddenLine>
-            </a:ext>
-          </a:extLst>
-        </p:spPr>
-        <p:txBody>
-          <a:bodyPr/>
-          <a:lstStyle>
-            <a:lvl1pPr eaLnBrk="0" hangingPunct="0">
-              <a:defRPr sz="2400">
-                <a:solidFill>
-                  <a:schemeClr val="tx1"/>
-                </a:solidFill>
-                <a:latin typeface="Verdana" charset="0"/>
-                <a:ea typeface="ＭＳ Ｐゴシック" charset="0"/>
-                <a:cs typeface="ＭＳ Ｐゴシック" charset="0"/>
-              </a:defRPr>
-            </a:lvl1pPr>
-            <a:lvl2pPr marL="742950" indent="-285750" eaLnBrk="0" hangingPunct="0">
-              <a:defRPr sz="2400">
-                <a:solidFill>
-                  <a:schemeClr val="tx1"/>
-                </a:solidFill>
-                <a:latin typeface="Verdana" charset="0"/>
-                <a:ea typeface="ＭＳ Ｐゴシック" charset="0"/>
-              </a:defRPr>
-            </a:lvl2pPr>
-            <a:lvl3pPr marL="1143000" indent="-228600" eaLnBrk="0" hangingPunct="0">
-              <a:defRPr sz="2400">
-                <a:solidFill>
-                  <a:schemeClr val="tx1"/>
-                </a:solidFill>
-                <a:latin typeface="Verdana" charset="0"/>
-                <a:ea typeface="ＭＳ Ｐゴシック" charset="0"/>
-              </a:defRPr>
-            </a:lvl3pPr>
-            <a:lvl4pPr marL="1600200" indent="-228600" eaLnBrk="0" hangingPunct="0">
-              <a:defRPr sz="2400">
-                <a:solidFill>
-                  <a:schemeClr val="tx1"/>
-                </a:solidFill>
-                <a:latin typeface="Verdana" charset="0"/>
-                <a:ea typeface="ＭＳ Ｐゴシック" charset="0"/>
-              </a:defRPr>
-            </a:lvl4pPr>
-            <a:lvl5pPr marL="2057400" indent="-228600" eaLnBrk="0" hangingPunct="0">
-              <a:defRPr sz="2400">
-                <a:solidFill>
-                  <a:schemeClr val="tx1"/>
-                </a:solidFill>
-                <a:latin typeface="Verdana" charset="0"/>
-                <a:ea typeface="ＭＳ Ｐゴシック" charset="0"/>
-              </a:defRPr>
-            </a:lvl5pPr>
-            <a:lvl6pPr marL="2514600" indent="-228600" eaLnBrk="0" fontAlgn="base" hangingPunct="0">
-              <a:spcBef>
-                <a:spcPct val="0"/>
-              </a:spcBef>
-              <a:spcAft>
-                <a:spcPct val="0"/>
-              </a:spcAft>
-              <a:defRPr sz="2400">
-                <a:solidFill>
-                  <a:schemeClr val="tx1"/>
-                </a:solidFill>
-                <a:latin typeface="Verdana" charset="0"/>
-                <a:ea typeface="ＭＳ Ｐゴシック" charset="0"/>
-              </a:defRPr>
-            </a:lvl6pPr>
-            <a:lvl7pPr marL="2971800" indent="-228600" eaLnBrk="0" fontAlgn="base" hangingPunct="0">
-              <a:spcBef>
-                <a:spcPct val="0"/>
-              </a:spcBef>
-              <a:spcAft>
-                <a:spcPct val="0"/>
-              </a:spcAft>
-              <a:defRPr sz="2400">
-                <a:solidFill>
-                  <a:schemeClr val="tx1"/>
-                </a:solidFill>
-                <a:latin typeface="Verdana" charset="0"/>
-                <a:ea typeface="ＭＳ Ｐゴシック" charset="0"/>
-              </a:defRPr>
-            </a:lvl7pPr>
-            <a:lvl8pPr marL="3429000" indent="-228600" eaLnBrk="0" fontAlgn="base" hangingPunct="0">
-              <a:spcBef>
-                <a:spcPct val="0"/>
-              </a:spcBef>
-              <a:spcAft>
-                <a:spcPct val="0"/>
-              </a:spcAft>
-              <a:defRPr sz="2400">
-                <a:solidFill>
-                  <a:schemeClr val="tx1"/>
-                </a:solidFill>
-                <a:latin typeface="Verdana" charset="0"/>
-                <a:ea typeface="ＭＳ Ｐゴシック" charset="0"/>
-              </a:defRPr>
-            </a:lvl8pPr>
-            <a:lvl9pPr marL="3886200" indent="-228600" eaLnBrk="0" fontAlgn="base" hangingPunct="0">
-              <a:spcBef>
-                <a:spcPct val="0"/>
-              </a:spcBef>
-              <a:spcAft>
-                <a:spcPct val="0"/>
-              </a:spcAft>
-              <a:defRPr sz="2400">
-                <a:solidFill>
-                  <a:schemeClr val="tx1"/>
-                </a:solidFill>
-                <a:latin typeface="Verdana" charset="0"/>
-                <a:ea typeface="ＭＳ Ｐゴシック" charset="0"/>
-              </a:defRPr>
-            </a:lvl9pPr>
-          </a:lstStyle>
-          <a:p>
-            <a:fld id="{2F106329-1E2C-124D-9538-AF52D439D180}" type="slidenum">
-              <a:rPr lang="de-DE" sz="1200">
-                <a:latin typeface="Andale Mono" charset="0"/>
-              </a:rPr>
-              <a:pPr/>
-              <a:t>2</a:t>
-            </a:fld>
-            <a:endParaRPr lang="de-DE" sz="1200">
-              <a:latin typeface="Andale Mono" charset="0"/>
-            </a:endParaRPr>
-          </a:p>
-        </p:txBody>
-      </p:sp>
-      <p:sp>
-        <p:nvSpPr>
-          <p:cNvPr id="6146" name="Rectangle 2"/>
-          <p:cNvSpPr>
-            <a:spLocks noGrp="1" noRot="1" noChangeAspect="1" noChangeArrowheads="1" noTextEdit="1"/>
+            <a:spLocks noGrp="1" noRot="1" noChangeAspect="1"/>
           </p:cNvSpPr>
           <p:nvPr>
             <p:ph type="sldImg"/>
           </p:nvPr>
         </p:nvSpPr>
-        <p:spPr>
-          <a:ln/>
-        </p:spPr>
+        <p:spPr/>
       </p:sp>
       <p:sp>
         <p:nvSpPr>
-          <p:cNvPr id="6147" name="Rectangle 3"/>
+          <p:cNvPr id="3" name="Notizenplatzhalter 2"/>
           <p:cNvSpPr>
-            <a:spLocks noGrp="1" noChangeArrowheads="1"/>
+            <a:spLocks noGrp="1"/>
           </p:cNvSpPr>
           <p:nvPr>
             <p:ph type="body" idx="1"/>
           </p:nvPr>
         </p:nvSpPr>
-        <p:spPr>
-          <a:noFill/>
-          <a:ln/>
-          <a:extLst>
-            <a:ext uri="{909E8E84-426E-40DD-AFC4-6F175D3DCCD1}">
-              <a14:hiddenFill xmlns:a14="http://schemas.microsoft.com/office/drawing/2010/main">
-                <a:solidFill>
-                  <a:srgbClr val="FFFFFF"/>
-                </a:solidFill>
-              </a14:hiddenFill>
-            </a:ext>
-            <a:ext uri="{91240B29-F687-4F45-9708-019B960494DF}">
-              <a14:hiddenLine xmlns:a14="http://schemas.microsoft.com/office/drawing/2010/main" w="9525">
-                <a:solidFill>
-                  <a:srgbClr val="000000"/>
-                </a:solidFill>
-                <a:miter lim="800000"/>
-                <a:headEnd/>
-                <a:tailEnd/>
-              </a14:hiddenLine>
-            </a:ext>
-          </a:extLst>
-        </p:spPr>
+        <p:spPr/>
         <p:txBody>
           <a:bodyPr/>
           <a:lstStyle/>
           <a:p>
-            <a:pPr eaLnBrk="1" hangingPunct="1"/>
-            <a:r>
-              <a:rPr lang="de-DE" dirty="0"/>
-              <a:t>Langsam sprechen</a:t>
-            </a:r>
-          </a:p>
-          <a:p>
-            <a:pPr eaLnBrk="1" hangingPunct="1"/>
-            <a:r>
-              <a:rPr lang="de-DE" dirty="0"/>
-              <a:t>Einen Schluck Wasser nehmen, wenn nötig </a:t>
-            </a:r>
-          </a:p>
-          <a:p>
-            <a:pPr eaLnBrk="1" hangingPunct="1"/>
-            <a:r>
-              <a:rPr lang="de-DE" dirty="0"/>
-              <a:t>Körperhaltung: aufrecht</a:t>
-            </a:r>
-          </a:p>
-          <a:p>
-            <a:pPr eaLnBrk="1" hangingPunct="1"/>
-            <a:r>
-              <a:rPr lang="de-DE" dirty="0"/>
-              <a:t>Zu Vortragsbeginn: Schultern gerade, entspannen</a:t>
-            </a:r>
-          </a:p>
-          <a:p>
-            <a:pPr eaLnBrk="1" hangingPunct="1"/>
+            <a:pPr marL="171450" indent="-171450">
+              <a:buFont typeface="Arial" panose="020B0604020202020204" pitchFamily="34" charset="0"/>
+              <a:buChar char="•"/>
+            </a:pPr>
+            <a:r>
+              <a:rPr lang="en-US" dirty="0" smtClean="0"/>
+              <a:t>regular access control, intrusion detection systems, ... not usable, because users are allowed too perform actions</a:t>
+            </a:r>
+          </a:p>
+          <a:p>
+            <a:pPr marL="171450" indent="-171450">
+              <a:buFont typeface="Arial" panose="020B0604020202020204" pitchFamily="34" charset="0"/>
+              <a:buChar char="•"/>
+            </a:pPr>
+            <a:r>
+              <a:rPr lang="en-US" dirty="0" smtClean="0"/>
+              <a:t/>
+            </a:r>
+            <a:br>
+              <a:rPr lang="en-US" dirty="0" smtClean="0"/>
+            </a:br>
+            <a:r>
+              <a:rPr lang="en-US" dirty="0" smtClean="0"/>
+              <a:t>-&gt; </a:t>
+            </a:r>
+            <a:r>
+              <a:rPr lang="en-US" b="1" dirty="0" smtClean="0"/>
+              <a:t>anomaly-based detection </a:t>
+            </a:r>
+            <a:r>
+              <a:rPr lang="en-US" dirty="0" smtClean="0"/>
+              <a:t>= comparing current user </a:t>
+            </a:r>
+            <a:r>
+              <a:rPr lang="en-US" dirty="0" err="1" smtClean="0"/>
+              <a:t>behaviour</a:t>
+            </a:r>
+            <a:r>
+              <a:rPr lang="en-US" dirty="0" smtClean="0"/>
+              <a:t> with common user </a:t>
+            </a:r>
+            <a:r>
+              <a:rPr lang="en-US" dirty="0" err="1" smtClean="0"/>
+              <a:t>behaviour</a:t>
+            </a:r>
+            <a:r>
+              <a:rPr lang="en-US" dirty="0" smtClean="0"/>
+              <a:t> (statistical approach/machine learning)</a:t>
+            </a:r>
+          </a:p>
+          <a:p>
+            <a:pPr marL="171450" indent="-171450">
+              <a:buFont typeface="Arial" panose="020B0604020202020204" pitchFamily="34" charset="0"/>
+              <a:buChar char="•"/>
+            </a:pPr>
+            <a:r>
+              <a:rPr lang="en-US" dirty="0" smtClean="0"/>
+              <a:t>requires a lot of data</a:t>
+            </a:r>
+          </a:p>
+          <a:p>
+            <a:pPr marL="171450" indent="-171450">
+              <a:buFont typeface="Arial" panose="020B0604020202020204" pitchFamily="34" charset="0"/>
+              <a:buChar char="•"/>
+            </a:pPr>
+            <a:endParaRPr lang="en-US" dirty="0" smtClean="0"/>
+          </a:p>
+          <a:p>
+            <a:pPr marL="171450" indent="-171450">
+              <a:buFont typeface="Arial" panose="020B0604020202020204" pitchFamily="34" charset="0"/>
+              <a:buChar char="•"/>
+            </a:pPr>
+            <a:r>
+              <a:rPr lang="en-US" dirty="0" smtClean="0"/>
+              <a:t>But storing and processing this data can collide with the privacy of employees</a:t>
+            </a:r>
+          </a:p>
+          <a:p>
+            <a:pPr marL="171450" indent="-171450">
+              <a:buFont typeface="Arial" panose="020B0604020202020204" pitchFamily="34" charset="0"/>
+              <a:buChar char="•"/>
+            </a:pPr>
+            <a:r>
+              <a:rPr lang="en-US" i="1" dirty="0" smtClean="0"/>
+              <a:t>Bundesdatenschutzgesetz</a:t>
+            </a:r>
+            <a:r>
+              <a:rPr lang="en-US" dirty="0" smtClean="0"/>
+              <a:t>,§32, 1:</a:t>
+            </a:r>
+            <a:br>
+              <a:rPr lang="en-US" dirty="0" smtClean="0"/>
+            </a:br>
+            <a:r>
+              <a:rPr lang="en-US" dirty="0" smtClean="0"/>
+              <a:t>Data related to employees may just be used for detecting crimes when there is concrete evidence </a:t>
+            </a:r>
+          </a:p>
+          <a:p>
+            <a:pPr marL="171450" indent="-171450">
+              <a:buFont typeface="Arial" panose="020B0604020202020204" pitchFamily="34" charset="0"/>
+              <a:buChar char="•"/>
+            </a:pPr>
+            <a:r>
+              <a:rPr lang="en-US" dirty="0" smtClean="0"/>
+              <a:t>BAG Erfurt:</a:t>
+            </a:r>
+            <a:br>
+              <a:rPr lang="en-US" dirty="0" smtClean="0"/>
+            </a:br>
+            <a:r>
+              <a:rPr lang="en-US" dirty="0" smtClean="0"/>
+              <a:t>Using</a:t>
+            </a:r>
+            <a:r>
+              <a:rPr lang="en-US" baseline="0" dirty="0" smtClean="0"/>
+              <a:t> </a:t>
+            </a:r>
+            <a:r>
+              <a:rPr lang="en-US" baseline="0" dirty="0" err="1" smtClean="0"/>
+              <a:t>keyloggers</a:t>
+            </a:r>
+            <a:r>
+              <a:rPr lang="en-US" baseline="0" dirty="0" smtClean="0"/>
+              <a:t> to test user </a:t>
+            </a:r>
+            <a:r>
+              <a:rPr lang="en-US" baseline="0" dirty="0" err="1" smtClean="0"/>
+              <a:t>behaviour</a:t>
+            </a:r>
+            <a:r>
+              <a:rPr lang="en-US" baseline="0" dirty="0" smtClean="0"/>
+              <a:t> is not allowed</a:t>
+            </a:r>
+            <a:endParaRPr lang="de-DE" dirty="0" smtClean="0"/>
+          </a:p>
+          <a:p>
+            <a:pPr marL="171450" indent="-171450">
+              <a:buFont typeface="Arial" panose="020B0604020202020204" pitchFamily="34" charset="0"/>
+              <a:buChar char="•"/>
+            </a:pPr>
             <a:endParaRPr lang="de-DE" dirty="0"/>
+          </a:p>
+        </p:txBody>
+      </p:sp>
+      <p:sp>
+        <p:nvSpPr>
+          <p:cNvPr id="4" name="Foliennummernplatzhalter 3"/>
+          <p:cNvSpPr>
+            <a:spLocks noGrp="1"/>
+          </p:cNvSpPr>
+          <p:nvPr>
+            <p:ph type="sldNum" sz="quarter" idx="10"/>
+          </p:nvPr>
+        </p:nvSpPr>
+        <p:spPr/>
+        <p:txBody>
+          <a:bodyPr/>
+          <a:lstStyle/>
+          <a:p>
+            <a:pPr>
+              <a:defRPr/>
+            </a:pPr>
+            <a:fld id="{9DDC5E44-63C0-EF42-9B94-8202B4B6C3D9}" type="slidenum">
+              <a:rPr lang="de-DE" smtClean="0"/>
+              <a:pPr>
+                <a:defRPr/>
+              </a:pPr>
+              <a:t>4</a:t>
+            </a:fld>
+            <a:endParaRPr lang="de-DE"/>
           </a:p>
         </p:txBody>
       </p:sp>
     </p:spTree>
+    <p:extLst>
+      <p:ext uri="{BB962C8B-B14F-4D97-AF65-F5344CB8AC3E}">
+        <p14:creationId xmlns:p14="http://schemas.microsoft.com/office/powerpoint/2010/main" val="2430395130"/>
+      </p:ext>
+    </p:extLst>
   </p:cSld>
   <p:clrMapOvr>
     <a:masterClrMapping/>
@@ -2166,147 +2131,302 @@
           <a:bodyPr/>
           <a:lstStyle/>
           <a:p>
-            <a:pPr marL="171450" indent="-171450">
-              <a:buFont typeface="Arial" panose="020B0604020202020204" pitchFamily="34" charset="0"/>
-              <a:buChar char="•"/>
-            </a:pPr>
-            <a:r>
-              <a:rPr lang="en-US" dirty="0" smtClean="0"/>
-              <a:t>regular access control, intrusion detection systems, ... not usable, because users are allowed too perform actions</a:t>
-            </a:r>
-          </a:p>
-          <a:p>
-            <a:pPr marL="171450" indent="-171450">
-              <a:buFont typeface="Arial" panose="020B0604020202020204" pitchFamily="34" charset="0"/>
-              <a:buChar char="•"/>
-            </a:pPr>
-            <a:r>
-              <a:rPr lang="en-US" dirty="0" smtClean="0"/>
-              <a:t/>
-            </a:r>
-            <a:br>
-              <a:rPr lang="en-US" dirty="0" smtClean="0"/>
-            </a:br>
-            <a:r>
-              <a:rPr lang="en-US" dirty="0" smtClean="0"/>
-              <a:t>-&gt; </a:t>
-            </a:r>
-            <a:r>
-              <a:rPr lang="en-US" b="1" dirty="0" smtClean="0"/>
-              <a:t>anomaly-based detection </a:t>
-            </a:r>
-            <a:r>
-              <a:rPr lang="en-US" dirty="0" smtClean="0"/>
-              <a:t>= comparing current user </a:t>
-            </a:r>
-            <a:r>
-              <a:rPr lang="en-US" dirty="0" err="1" smtClean="0"/>
-              <a:t>behaviour</a:t>
-            </a:r>
-            <a:r>
-              <a:rPr lang="en-US" dirty="0" smtClean="0"/>
-              <a:t> with common user </a:t>
-            </a:r>
-            <a:r>
-              <a:rPr lang="en-US" dirty="0" err="1" smtClean="0"/>
-              <a:t>behaviour</a:t>
-            </a:r>
-            <a:r>
-              <a:rPr lang="en-US" dirty="0" smtClean="0"/>
-              <a:t> (statistical approach/machine learning)</a:t>
-            </a:r>
-          </a:p>
-          <a:p>
-            <a:pPr marL="171450" indent="-171450">
-              <a:buFont typeface="Arial" panose="020B0604020202020204" pitchFamily="34" charset="0"/>
-              <a:buChar char="•"/>
-            </a:pPr>
-            <a:r>
-              <a:rPr lang="en-US" dirty="0" smtClean="0"/>
-              <a:t>requires a lot of data</a:t>
-            </a:r>
-          </a:p>
-          <a:p>
-            <a:pPr marL="171450" indent="-171450">
-              <a:buFont typeface="Arial" panose="020B0604020202020204" pitchFamily="34" charset="0"/>
-              <a:buChar char="•"/>
-            </a:pPr>
-            <a:endParaRPr lang="en-US" dirty="0" smtClean="0"/>
-          </a:p>
-          <a:p>
-            <a:pPr marL="171450" indent="-171450">
-              <a:buFont typeface="Arial" panose="020B0604020202020204" pitchFamily="34" charset="0"/>
-              <a:buChar char="•"/>
-            </a:pPr>
-            <a:r>
-              <a:rPr lang="en-US" dirty="0" smtClean="0"/>
-              <a:t>But storing and processing this data can collide with the privacy of employees</a:t>
-            </a:r>
-          </a:p>
-          <a:p>
-            <a:pPr marL="171450" indent="-171450">
-              <a:buFont typeface="Arial" panose="020B0604020202020204" pitchFamily="34" charset="0"/>
-              <a:buChar char="•"/>
-            </a:pPr>
-            <a:r>
-              <a:rPr lang="en-US" i="1" dirty="0" smtClean="0"/>
-              <a:t>Bundesdatenschutzgesetz</a:t>
-            </a:r>
-            <a:r>
-              <a:rPr lang="en-US" dirty="0" smtClean="0"/>
-              <a:t>,§32, 1:</a:t>
-            </a:r>
-            <a:br>
-              <a:rPr lang="en-US" dirty="0" smtClean="0"/>
-            </a:br>
-            <a:r>
-              <a:rPr lang="en-US" dirty="0" smtClean="0"/>
-              <a:t>Data related to employees may just be used for detecting crimes when there is concrete evidence </a:t>
-            </a:r>
-          </a:p>
-          <a:p>
-            <a:pPr marL="171450" indent="-171450">
-              <a:buFont typeface="Arial" panose="020B0604020202020204" pitchFamily="34" charset="0"/>
-              <a:buChar char="•"/>
-            </a:pPr>
-            <a:r>
-              <a:rPr lang="en-US" dirty="0" smtClean="0"/>
-              <a:t>BAG Erfurt:</a:t>
-            </a:r>
-            <a:br>
-              <a:rPr lang="en-US" dirty="0" smtClean="0"/>
-            </a:br>
-            <a:r>
-              <a:rPr lang="en-US" dirty="0" smtClean="0"/>
-              <a:t>Using</a:t>
-            </a:r>
-            <a:r>
-              <a:rPr lang="en-US" baseline="0" dirty="0" smtClean="0"/>
-              <a:t> </a:t>
-            </a:r>
-            <a:r>
-              <a:rPr lang="en-US" baseline="0" dirty="0" err="1" smtClean="0"/>
-              <a:t>keyloggers</a:t>
-            </a:r>
-            <a:r>
-              <a:rPr lang="en-US" baseline="0" dirty="0" smtClean="0"/>
-              <a:t> to test user </a:t>
-            </a:r>
-            <a:r>
-              <a:rPr lang="en-US" baseline="0" dirty="0" err="1" smtClean="0"/>
-              <a:t>behaviour</a:t>
-            </a:r>
-            <a:r>
-              <a:rPr lang="en-US" baseline="0" dirty="0" smtClean="0"/>
-              <a:t> is not allowed</a:t>
-            </a:r>
-            <a:endParaRPr lang="de-DE" dirty="0" smtClean="0"/>
-          </a:p>
-          <a:p>
-            <a:pPr marL="171450" indent="-171450">
-              <a:buFont typeface="Arial" panose="020B0604020202020204" pitchFamily="34" charset="0"/>
-              <a:buChar char="•"/>
-            </a:pPr>
+            <a:pPr algn="r"/>
+            <a:r>
+              <a:rPr lang="de-DE" kern="0" dirty="0" smtClean="0"/>
+              <a:t>(</a:t>
+            </a:r>
+            <a:r>
+              <a:rPr lang="de-DE" kern="0" dirty="0" err="1" smtClean="0"/>
+              <a:t>t,n</a:t>
+            </a:r>
+            <a:r>
+              <a:rPr lang="de-DE" kern="0" dirty="0" smtClean="0"/>
+              <a:t>) </a:t>
+            </a:r>
+            <a:r>
+              <a:rPr lang="de-DE" kern="0" dirty="0" err="1" smtClean="0"/>
+              <a:t>secret</a:t>
+            </a:r>
+            <a:r>
+              <a:rPr lang="de-DE" kern="0" dirty="0" smtClean="0"/>
+              <a:t> </a:t>
+            </a:r>
+            <a:r>
+              <a:rPr lang="de-DE" kern="0" dirty="0" err="1" smtClean="0"/>
+              <a:t>sharing</a:t>
+            </a:r>
+            <a:r>
+              <a:rPr lang="de-DE" kern="0" dirty="0" smtClean="0"/>
+              <a:t> </a:t>
+            </a:r>
+            <a:r>
+              <a:rPr lang="de-DE" kern="0" dirty="0" err="1" smtClean="0"/>
+              <a:t>scheme</a:t>
+            </a:r>
+            <a:endParaRPr lang="de-DE" kern="0" dirty="0" smtClean="0"/>
+          </a:p>
+          <a:p>
+            <a:pPr algn="r"/>
+            <a:r>
+              <a:rPr lang="de-DE" kern="0" dirty="0" smtClean="0"/>
+              <a:t>- n: # </a:t>
+            </a:r>
+            <a:r>
+              <a:rPr lang="de-DE" kern="0" dirty="0" err="1" smtClean="0"/>
+              <a:t>parts</a:t>
+            </a:r>
+            <a:r>
+              <a:rPr lang="de-DE" kern="0" dirty="0" smtClean="0"/>
+              <a:t> (</a:t>
+            </a:r>
+            <a:r>
+              <a:rPr lang="de-DE" kern="0" dirty="0" err="1" smtClean="0"/>
+              <a:t>shares</a:t>
+            </a:r>
+            <a:r>
+              <a:rPr lang="de-DE" kern="0" dirty="0" smtClean="0"/>
+              <a:t>) </a:t>
+            </a:r>
+          </a:p>
+          <a:p>
+            <a:pPr algn="r"/>
+            <a:r>
+              <a:rPr lang="de-DE" kern="0" dirty="0" smtClean="0"/>
+              <a:t>- t: </a:t>
+            </a:r>
+            <a:r>
+              <a:rPr lang="de-DE" kern="0" dirty="0" err="1" smtClean="0"/>
+              <a:t>shares</a:t>
+            </a:r>
+            <a:r>
+              <a:rPr lang="de-DE" kern="0" dirty="0" smtClean="0"/>
+              <a:t> </a:t>
+            </a:r>
+            <a:r>
+              <a:rPr lang="de-DE" kern="0" dirty="0" err="1" smtClean="0"/>
+              <a:t>required</a:t>
+            </a:r>
+            <a:r>
+              <a:rPr lang="de-DE" kern="0" dirty="0" smtClean="0"/>
+              <a:t> </a:t>
+            </a:r>
+            <a:r>
+              <a:rPr lang="de-DE" kern="0" dirty="0" err="1" smtClean="0"/>
+              <a:t>for</a:t>
+            </a:r>
+            <a:r>
+              <a:rPr lang="de-DE" kern="0" dirty="0" smtClean="0"/>
+              <a:t> </a:t>
+            </a:r>
+            <a:r>
+              <a:rPr lang="de-DE" kern="0" dirty="0" err="1" smtClean="0"/>
+              <a:t>restoring</a:t>
+            </a:r>
+            <a:r>
+              <a:rPr lang="de-DE" kern="0" dirty="0" smtClean="0"/>
+              <a:t> </a:t>
+            </a:r>
+            <a:r>
+              <a:rPr lang="de-DE" kern="0" dirty="0" err="1" smtClean="0"/>
+              <a:t>the</a:t>
+            </a:r>
+            <a:r>
+              <a:rPr lang="de-DE" kern="0" dirty="0" smtClean="0"/>
+              <a:t> </a:t>
+            </a:r>
+            <a:r>
+              <a:rPr lang="de-DE" kern="0" dirty="0" err="1" smtClean="0"/>
+              <a:t>secret</a:t>
+            </a:r>
+            <a:endParaRPr lang="de-DE" kern="0" dirty="0" smtClean="0"/>
+          </a:p>
+          <a:p>
+            <a:pPr algn="r"/>
+            <a:endParaRPr lang="de-DE" b="1" kern="0" dirty="0" smtClean="0"/>
+          </a:p>
+          <a:p>
+            <a:pPr algn="r"/>
+            <a:r>
+              <a:rPr lang="de-DE" b="1" kern="0" dirty="0" err="1" smtClean="0"/>
+              <a:t>Threshold</a:t>
+            </a:r>
+            <a:r>
+              <a:rPr lang="de-DE" b="1" kern="0" dirty="0" smtClean="0"/>
+              <a:t> </a:t>
+            </a:r>
+            <a:r>
+              <a:rPr lang="de-DE" b="1" kern="0" dirty="0" err="1" smtClean="0"/>
+              <a:t>decryption</a:t>
+            </a:r>
+            <a:endParaRPr lang="de-DE" b="1" kern="0" dirty="0" smtClean="0"/>
+          </a:p>
+          <a:p>
+            <a:pPr algn="r"/>
+            <a:r>
+              <a:rPr lang="de-DE" kern="0" dirty="0" smtClean="0"/>
+              <a:t>Public </a:t>
+            </a:r>
+            <a:r>
+              <a:rPr lang="de-DE" kern="0" dirty="0" err="1" smtClean="0"/>
+              <a:t>key</a:t>
+            </a:r>
+            <a:r>
+              <a:rPr lang="de-DE" kern="0" dirty="0" smtClean="0"/>
+              <a:t> </a:t>
+            </a:r>
+            <a:r>
+              <a:rPr lang="de-DE" kern="0" dirty="0" err="1" smtClean="0"/>
+              <a:t>scheme</a:t>
+            </a:r>
+            <a:endParaRPr lang="de-DE" kern="0" dirty="0" smtClean="0"/>
+          </a:p>
+          <a:p>
+            <a:pPr algn="r"/>
+            <a:r>
+              <a:rPr lang="de-DE" kern="0" dirty="0" err="1" smtClean="0"/>
+              <a:t>Decryption</a:t>
+            </a:r>
+            <a:r>
+              <a:rPr lang="de-DE" kern="0" dirty="0" smtClean="0"/>
+              <a:t> </a:t>
+            </a:r>
+            <a:r>
+              <a:rPr lang="de-DE" kern="0" dirty="0" err="1" smtClean="0"/>
+              <a:t>requires</a:t>
+            </a:r>
+            <a:r>
+              <a:rPr lang="de-DE" kern="0" dirty="0" smtClean="0"/>
+              <a:t> at least t </a:t>
+            </a:r>
+            <a:r>
+              <a:rPr lang="de-DE" kern="0" dirty="0" err="1" smtClean="0"/>
+              <a:t>participants</a:t>
+            </a:r>
+            <a:r>
+              <a:rPr lang="de-DE" kern="0" dirty="0" smtClean="0"/>
+              <a:t> (</a:t>
+            </a:r>
+            <a:r>
+              <a:rPr lang="de-DE" kern="0" dirty="0" err="1" smtClean="0"/>
+              <a:t>share</a:t>
+            </a:r>
+            <a:r>
+              <a:rPr lang="de-DE" kern="0" dirty="0" smtClean="0"/>
+              <a:t> </a:t>
+            </a:r>
+            <a:r>
+              <a:rPr lang="de-DE" kern="0" dirty="0" err="1" smtClean="0"/>
+              <a:t>owners</a:t>
+            </a:r>
+            <a:r>
+              <a:rPr lang="de-DE" kern="0" dirty="0" smtClean="0"/>
+              <a:t>)</a:t>
+            </a:r>
+          </a:p>
+          <a:p>
+            <a:pPr algn="r"/>
+            <a:r>
+              <a:rPr lang="de-DE" kern="0" dirty="0" smtClean="0"/>
+              <a:t>Message </a:t>
+            </a:r>
+            <a:r>
+              <a:rPr lang="de-DE" kern="0" dirty="0" err="1" smtClean="0"/>
+              <a:t>is</a:t>
+            </a:r>
+            <a:r>
+              <a:rPr lang="de-DE" kern="0" dirty="0" smtClean="0"/>
+              <a:t> </a:t>
+            </a:r>
+            <a:r>
+              <a:rPr lang="de-DE" kern="0" dirty="0" err="1" smtClean="0"/>
+              <a:t>decrypted</a:t>
+            </a:r>
+            <a:r>
+              <a:rPr lang="de-DE" kern="0" dirty="0" smtClean="0"/>
+              <a:t> but </a:t>
+            </a:r>
+            <a:r>
+              <a:rPr lang="de-DE" kern="0" dirty="0" err="1" smtClean="0"/>
+              <a:t>secret</a:t>
+            </a:r>
+            <a:r>
+              <a:rPr lang="de-DE" kern="0" dirty="0" smtClean="0"/>
+              <a:t> </a:t>
+            </a:r>
+            <a:r>
+              <a:rPr lang="de-DE" kern="0" dirty="0" err="1" smtClean="0"/>
+              <a:t>key</a:t>
+            </a:r>
+            <a:r>
+              <a:rPr lang="de-DE" kern="0" dirty="0" smtClean="0"/>
+              <a:t> </a:t>
+            </a:r>
+            <a:r>
+              <a:rPr lang="de-DE" kern="0" dirty="0" err="1" smtClean="0"/>
+              <a:t>is</a:t>
+            </a:r>
+            <a:r>
+              <a:rPr lang="de-DE" kern="0" dirty="0" smtClean="0"/>
+              <a:t> NOT </a:t>
+            </a:r>
+            <a:r>
+              <a:rPr lang="de-DE" kern="0" dirty="0" err="1" smtClean="0"/>
+              <a:t>restored</a:t>
+            </a:r>
+            <a:endParaRPr lang="de-DE" kern="0" dirty="0" smtClean="0"/>
+          </a:p>
+          <a:p>
+            <a:pPr algn="r"/>
+            <a:r>
+              <a:rPr lang="de-DE" kern="0" dirty="0" smtClean="0"/>
+              <a:t>Advantages: </a:t>
+            </a:r>
+            <a:r>
+              <a:rPr lang="de-DE" kern="0" dirty="0" err="1" smtClean="0"/>
+              <a:t>distributed</a:t>
+            </a:r>
+            <a:r>
+              <a:rPr lang="de-DE" kern="0" dirty="0" smtClean="0"/>
+              <a:t> </a:t>
+            </a:r>
+            <a:r>
+              <a:rPr lang="de-DE" kern="0" dirty="0" err="1" smtClean="0"/>
+              <a:t>trust</a:t>
+            </a:r>
+            <a:r>
+              <a:rPr lang="de-DE" kern="0" dirty="0" smtClean="0"/>
+              <a:t>, </a:t>
+            </a:r>
+            <a:r>
+              <a:rPr lang="de-DE" kern="0" dirty="0" err="1" smtClean="0"/>
+              <a:t>prevents</a:t>
+            </a:r>
+            <a:r>
+              <a:rPr lang="de-DE" kern="0" dirty="0" smtClean="0"/>
+              <a:t> „</a:t>
+            </a:r>
+            <a:r>
+              <a:rPr lang="de-DE" kern="0" dirty="0" err="1" smtClean="0"/>
+              <a:t>blocking</a:t>
+            </a:r>
+            <a:r>
+              <a:rPr lang="de-DE" kern="0" dirty="0" smtClean="0"/>
+              <a:t>“ </a:t>
+            </a:r>
+            <a:r>
+              <a:rPr lang="de-DE" kern="0" dirty="0" err="1" smtClean="0"/>
+              <a:t>participants</a:t>
+            </a:r>
+            <a:r>
+              <a:rPr lang="de-DE" kern="0" dirty="0" smtClean="0"/>
+              <a:t> </a:t>
+            </a:r>
+          </a:p>
+          <a:p>
+            <a:endParaRPr lang="de-DE" kern="0" dirty="0" smtClean="0"/>
+          </a:p>
+          <a:p>
             <a:endParaRPr lang="de-DE" dirty="0"/>
           </a:p>
         </p:txBody>
@@ -2343,7 +2463,7 @@
     </p:spTree>
     <p:extLst>
       <p:ext uri="{BB962C8B-B14F-4D97-AF65-F5344CB8AC3E}">
-        <p14:creationId xmlns:p14="http://schemas.microsoft.com/office/powerpoint/2010/main" val="2430395130"/>
+        <p14:creationId xmlns:p14="http://schemas.microsoft.com/office/powerpoint/2010/main" val="2854611297"/>
       </p:ext>
     </p:extLst>
   </p:cSld>
@@ -2397,302 +2517,6 @@
           <a:bodyPr/>
           <a:lstStyle/>
           <a:p>
-            <a:pPr algn="r"/>
-            <a:r>
-              <a:rPr lang="de-DE" kern="0" dirty="0" smtClean="0"/>
-              <a:t>(</a:t>
-            </a:r>
-            <a:r>
-              <a:rPr lang="de-DE" kern="0" dirty="0" err="1" smtClean="0"/>
-              <a:t>t,n</a:t>
-            </a:r>
-            <a:r>
-              <a:rPr lang="de-DE" kern="0" dirty="0" smtClean="0"/>
-              <a:t>) </a:t>
-            </a:r>
-            <a:r>
-              <a:rPr lang="de-DE" kern="0" dirty="0" err="1" smtClean="0"/>
-              <a:t>secret</a:t>
-            </a:r>
-            <a:r>
-              <a:rPr lang="de-DE" kern="0" dirty="0" smtClean="0"/>
-              <a:t> </a:t>
-            </a:r>
-            <a:r>
-              <a:rPr lang="de-DE" kern="0" dirty="0" err="1" smtClean="0"/>
-              <a:t>sharing</a:t>
-            </a:r>
-            <a:r>
-              <a:rPr lang="de-DE" kern="0" dirty="0" smtClean="0"/>
-              <a:t> </a:t>
-            </a:r>
-            <a:r>
-              <a:rPr lang="de-DE" kern="0" dirty="0" err="1" smtClean="0"/>
-              <a:t>scheme</a:t>
-            </a:r>
-            <a:endParaRPr lang="de-DE" kern="0" dirty="0" smtClean="0"/>
-          </a:p>
-          <a:p>
-            <a:pPr algn="r"/>
-            <a:r>
-              <a:rPr lang="de-DE" kern="0" dirty="0" smtClean="0"/>
-              <a:t>- n: # </a:t>
-            </a:r>
-            <a:r>
-              <a:rPr lang="de-DE" kern="0" dirty="0" err="1" smtClean="0"/>
-              <a:t>parts</a:t>
-            </a:r>
-            <a:r>
-              <a:rPr lang="de-DE" kern="0" dirty="0" smtClean="0"/>
-              <a:t> (</a:t>
-            </a:r>
-            <a:r>
-              <a:rPr lang="de-DE" kern="0" dirty="0" err="1" smtClean="0"/>
-              <a:t>shares</a:t>
-            </a:r>
-            <a:r>
-              <a:rPr lang="de-DE" kern="0" dirty="0" smtClean="0"/>
-              <a:t>) </a:t>
-            </a:r>
-          </a:p>
-          <a:p>
-            <a:pPr algn="r"/>
-            <a:r>
-              <a:rPr lang="de-DE" kern="0" dirty="0" smtClean="0"/>
-              <a:t>- t: </a:t>
-            </a:r>
-            <a:r>
-              <a:rPr lang="de-DE" kern="0" dirty="0" err="1" smtClean="0"/>
-              <a:t>shares</a:t>
-            </a:r>
-            <a:r>
-              <a:rPr lang="de-DE" kern="0" dirty="0" smtClean="0"/>
-              <a:t> </a:t>
-            </a:r>
-            <a:r>
-              <a:rPr lang="de-DE" kern="0" dirty="0" err="1" smtClean="0"/>
-              <a:t>required</a:t>
-            </a:r>
-            <a:r>
-              <a:rPr lang="de-DE" kern="0" dirty="0" smtClean="0"/>
-              <a:t> </a:t>
-            </a:r>
-            <a:r>
-              <a:rPr lang="de-DE" kern="0" dirty="0" err="1" smtClean="0"/>
-              <a:t>for</a:t>
-            </a:r>
-            <a:r>
-              <a:rPr lang="de-DE" kern="0" dirty="0" smtClean="0"/>
-              <a:t> </a:t>
-            </a:r>
-            <a:r>
-              <a:rPr lang="de-DE" kern="0" dirty="0" err="1" smtClean="0"/>
-              <a:t>restoring</a:t>
-            </a:r>
-            <a:r>
-              <a:rPr lang="de-DE" kern="0" dirty="0" smtClean="0"/>
-              <a:t> </a:t>
-            </a:r>
-            <a:r>
-              <a:rPr lang="de-DE" kern="0" dirty="0" err="1" smtClean="0"/>
-              <a:t>the</a:t>
-            </a:r>
-            <a:r>
-              <a:rPr lang="de-DE" kern="0" dirty="0" smtClean="0"/>
-              <a:t> </a:t>
-            </a:r>
-            <a:r>
-              <a:rPr lang="de-DE" kern="0" dirty="0" err="1" smtClean="0"/>
-              <a:t>secret</a:t>
-            </a:r>
-            <a:endParaRPr lang="de-DE" kern="0" dirty="0" smtClean="0"/>
-          </a:p>
-          <a:p>
-            <a:pPr algn="r"/>
-            <a:endParaRPr lang="de-DE" b="1" kern="0" dirty="0" smtClean="0"/>
-          </a:p>
-          <a:p>
-            <a:pPr algn="r"/>
-            <a:r>
-              <a:rPr lang="de-DE" b="1" kern="0" dirty="0" err="1" smtClean="0"/>
-              <a:t>Threshold</a:t>
-            </a:r>
-            <a:r>
-              <a:rPr lang="de-DE" b="1" kern="0" dirty="0" smtClean="0"/>
-              <a:t> </a:t>
-            </a:r>
-            <a:r>
-              <a:rPr lang="de-DE" b="1" kern="0" dirty="0" err="1" smtClean="0"/>
-              <a:t>decryption</a:t>
-            </a:r>
-            <a:endParaRPr lang="de-DE" b="1" kern="0" dirty="0" smtClean="0"/>
-          </a:p>
-          <a:p>
-            <a:pPr algn="r"/>
-            <a:r>
-              <a:rPr lang="de-DE" kern="0" dirty="0" smtClean="0"/>
-              <a:t>Public </a:t>
-            </a:r>
-            <a:r>
-              <a:rPr lang="de-DE" kern="0" dirty="0" err="1" smtClean="0"/>
-              <a:t>key</a:t>
-            </a:r>
-            <a:r>
-              <a:rPr lang="de-DE" kern="0" dirty="0" smtClean="0"/>
-              <a:t> </a:t>
-            </a:r>
-            <a:r>
-              <a:rPr lang="de-DE" kern="0" dirty="0" err="1" smtClean="0"/>
-              <a:t>scheme</a:t>
-            </a:r>
-            <a:endParaRPr lang="de-DE" kern="0" dirty="0" smtClean="0"/>
-          </a:p>
-          <a:p>
-            <a:pPr algn="r"/>
-            <a:r>
-              <a:rPr lang="de-DE" kern="0" dirty="0" err="1" smtClean="0"/>
-              <a:t>Decryption</a:t>
-            </a:r>
-            <a:r>
-              <a:rPr lang="de-DE" kern="0" dirty="0" smtClean="0"/>
-              <a:t> </a:t>
-            </a:r>
-            <a:r>
-              <a:rPr lang="de-DE" kern="0" dirty="0" err="1" smtClean="0"/>
-              <a:t>requires</a:t>
-            </a:r>
-            <a:r>
-              <a:rPr lang="de-DE" kern="0" dirty="0" smtClean="0"/>
-              <a:t> at least t </a:t>
-            </a:r>
-            <a:r>
-              <a:rPr lang="de-DE" kern="0" dirty="0" err="1" smtClean="0"/>
-              <a:t>participants</a:t>
-            </a:r>
-            <a:r>
-              <a:rPr lang="de-DE" kern="0" dirty="0" smtClean="0"/>
-              <a:t> (</a:t>
-            </a:r>
-            <a:r>
-              <a:rPr lang="de-DE" kern="0" dirty="0" err="1" smtClean="0"/>
-              <a:t>share</a:t>
-            </a:r>
-            <a:r>
-              <a:rPr lang="de-DE" kern="0" dirty="0" smtClean="0"/>
-              <a:t> </a:t>
-            </a:r>
-            <a:r>
-              <a:rPr lang="de-DE" kern="0" dirty="0" err="1" smtClean="0"/>
-              <a:t>owners</a:t>
-            </a:r>
-            <a:r>
-              <a:rPr lang="de-DE" kern="0" dirty="0" smtClean="0"/>
-              <a:t>)</a:t>
-            </a:r>
-          </a:p>
-          <a:p>
-            <a:pPr algn="r"/>
-            <a:r>
-              <a:rPr lang="de-DE" kern="0" dirty="0" smtClean="0"/>
-              <a:t>Message </a:t>
-            </a:r>
-            <a:r>
-              <a:rPr lang="de-DE" kern="0" dirty="0" err="1" smtClean="0"/>
-              <a:t>is</a:t>
-            </a:r>
-            <a:r>
-              <a:rPr lang="de-DE" kern="0" dirty="0" smtClean="0"/>
-              <a:t> </a:t>
-            </a:r>
-            <a:r>
-              <a:rPr lang="de-DE" kern="0" dirty="0" err="1" smtClean="0"/>
-              <a:t>decrypted</a:t>
-            </a:r>
-            <a:r>
-              <a:rPr lang="de-DE" kern="0" dirty="0" smtClean="0"/>
-              <a:t> but </a:t>
-            </a:r>
-            <a:r>
-              <a:rPr lang="de-DE" kern="0" dirty="0" err="1" smtClean="0"/>
-              <a:t>secret</a:t>
-            </a:r>
-            <a:r>
-              <a:rPr lang="de-DE" kern="0" dirty="0" smtClean="0"/>
-              <a:t> </a:t>
-            </a:r>
-            <a:r>
-              <a:rPr lang="de-DE" kern="0" dirty="0" err="1" smtClean="0"/>
-              <a:t>key</a:t>
-            </a:r>
-            <a:r>
-              <a:rPr lang="de-DE" kern="0" dirty="0" smtClean="0"/>
-              <a:t> </a:t>
-            </a:r>
-            <a:r>
-              <a:rPr lang="de-DE" kern="0" dirty="0" err="1" smtClean="0"/>
-              <a:t>is</a:t>
-            </a:r>
-            <a:r>
-              <a:rPr lang="de-DE" kern="0" dirty="0" smtClean="0"/>
-              <a:t> NOT </a:t>
-            </a:r>
-            <a:r>
-              <a:rPr lang="de-DE" kern="0" dirty="0" err="1" smtClean="0"/>
-              <a:t>restored</a:t>
-            </a:r>
-            <a:endParaRPr lang="de-DE" kern="0" dirty="0" smtClean="0"/>
-          </a:p>
-          <a:p>
-            <a:pPr algn="r"/>
-            <a:r>
-              <a:rPr lang="de-DE" kern="0" dirty="0" smtClean="0"/>
-              <a:t>Advantages: </a:t>
-            </a:r>
-            <a:r>
-              <a:rPr lang="de-DE" kern="0" dirty="0" err="1" smtClean="0"/>
-              <a:t>distributed</a:t>
-            </a:r>
-            <a:r>
-              <a:rPr lang="de-DE" kern="0" dirty="0" smtClean="0"/>
-              <a:t> </a:t>
-            </a:r>
-            <a:r>
-              <a:rPr lang="de-DE" kern="0" dirty="0" err="1" smtClean="0"/>
-              <a:t>trust</a:t>
-            </a:r>
-            <a:r>
-              <a:rPr lang="de-DE" kern="0" dirty="0" smtClean="0"/>
-              <a:t>, </a:t>
-            </a:r>
-            <a:r>
-              <a:rPr lang="de-DE" kern="0" dirty="0" err="1" smtClean="0"/>
-              <a:t>prevents</a:t>
-            </a:r>
-            <a:r>
-              <a:rPr lang="de-DE" kern="0" dirty="0" smtClean="0"/>
-              <a:t> „</a:t>
-            </a:r>
-            <a:r>
-              <a:rPr lang="de-DE" kern="0" dirty="0" err="1" smtClean="0"/>
-              <a:t>blocking</a:t>
-            </a:r>
-            <a:r>
-              <a:rPr lang="de-DE" kern="0" dirty="0" smtClean="0"/>
-              <a:t>“ </a:t>
-            </a:r>
-            <a:r>
-              <a:rPr lang="de-DE" kern="0" dirty="0" err="1" smtClean="0"/>
-              <a:t>participants</a:t>
-            </a:r>
-            <a:r>
-              <a:rPr lang="de-DE" kern="0" dirty="0" smtClean="0"/>
-              <a:t> </a:t>
-            </a:r>
-          </a:p>
-          <a:p>
-            <a:endParaRPr lang="de-DE" kern="0" dirty="0" smtClean="0"/>
-          </a:p>
-          <a:p>
             <a:endParaRPr lang="de-DE" dirty="0"/>
           </a:p>
         </p:txBody>
@@ -2720,7 +2544,7 @@
               <a:pPr>
                 <a:defRPr/>
               </a:pPr>
-              <a:t>6</a:t>
+              <a:t>8</a:t>
             </a:fld>
             <a:endParaRPr lang="de-DE"/>
           </a:p>
@@ -2758,70 +2582,246 @@
       </p:grpSpPr>
       <p:sp>
         <p:nvSpPr>
-          <p:cNvPr id="2" name="Folienbildplatzhalter 1"/>
+          <p:cNvPr id="6145" name="Rectangle 7"/>
           <p:cNvSpPr>
-            <a:spLocks noGrp="1" noRot="1" noChangeAspect="1"/>
+            <a:spLocks noGrp="1" noChangeArrowheads="1"/>
+          </p:cNvSpPr>
+          <p:nvPr>
+            <p:ph type="sldNum" sz="quarter" idx="5"/>
+          </p:nvPr>
+        </p:nvSpPr>
+        <p:spPr>
+          <a:noFill/>
+          <a:ln/>
+          <a:extLst>
+            <a:ext uri="{909E8E84-426E-40DD-AFC4-6F175D3DCCD1}">
+              <a14:hiddenFill xmlns:a14="http://schemas.microsoft.com/office/drawing/2010/main">
+                <a:solidFill>
+                  <a:srgbClr val="FFFFFF"/>
+                </a:solidFill>
+              </a14:hiddenFill>
+            </a:ext>
+            <a:ext uri="{91240B29-F687-4F45-9708-019B960494DF}">
+              <a14:hiddenLine xmlns:a14="http://schemas.microsoft.com/office/drawing/2010/main" w="9525">
+                <a:solidFill>
+                  <a:srgbClr val="000000"/>
+                </a:solidFill>
+                <a:miter lim="800000"/>
+                <a:headEnd/>
+                <a:tailEnd/>
+              </a14:hiddenLine>
+            </a:ext>
+          </a:extLst>
+        </p:spPr>
+        <p:txBody>
+          <a:bodyPr/>
+          <a:lstStyle>
+            <a:lvl1pPr eaLnBrk="0" hangingPunct="0">
+              <a:defRPr sz="2400">
+                <a:solidFill>
+                  <a:schemeClr val="tx1"/>
+                </a:solidFill>
+                <a:latin typeface="Verdana" charset="0"/>
+                <a:ea typeface="ＭＳ Ｐゴシック" charset="0"/>
+                <a:cs typeface="ＭＳ Ｐゴシック" charset="0"/>
+              </a:defRPr>
+            </a:lvl1pPr>
+            <a:lvl2pPr marL="742950" indent="-285750" eaLnBrk="0" hangingPunct="0">
+              <a:defRPr sz="2400">
+                <a:solidFill>
+                  <a:schemeClr val="tx1"/>
+                </a:solidFill>
+                <a:latin typeface="Verdana" charset="0"/>
+                <a:ea typeface="ＭＳ Ｐゴシック" charset="0"/>
+              </a:defRPr>
+            </a:lvl2pPr>
+            <a:lvl3pPr marL="1143000" indent="-228600" eaLnBrk="0" hangingPunct="0">
+              <a:defRPr sz="2400">
+                <a:solidFill>
+                  <a:schemeClr val="tx1"/>
+                </a:solidFill>
+                <a:latin typeface="Verdana" charset="0"/>
+                <a:ea typeface="ＭＳ Ｐゴシック" charset="0"/>
+              </a:defRPr>
+            </a:lvl3pPr>
+            <a:lvl4pPr marL="1600200" indent="-228600" eaLnBrk="0" hangingPunct="0">
+              <a:defRPr sz="2400">
+                <a:solidFill>
+                  <a:schemeClr val="tx1"/>
+                </a:solidFill>
+                <a:latin typeface="Verdana" charset="0"/>
+                <a:ea typeface="ＭＳ Ｐゴシック" charset="0"/>
+              </a:defRPr>
+            </a:lvl4pPr>
+            <a:lvl5pPr marL="2057400" indent="-228600" eaLnBrk="0" hangingPunct="0">
+              <a:defRPr sz="2400">
+                <a:solidFill>
+                  <a:schemeClr val="tx1"/>
+                </a:solidFill>
+                <a:latin typeface="Verdana" charset="0"/>
+                <a:ea typeface="ＭＳ Ｐゴシック" charset="0"/>
+              </a:defRPr>
+            </a:lvl5pPr>
+            <a:lvl6pPr marL="2514600" indent="-228600" eaLnBrk="0" fontAlgn="base" hangingPunct="0">
+              <a:spcBef>
+                <a:spcPct val="0"/>
+              </a:spcBef>
+              <a:spcAft>
+                <a:spcPct val="0"/>
+              </a:spcAft>
+              <a:defRPr sz="2400">
+                <a:solidFill>
+                  <a:schemeClr val="tx1"/>
+                </a:solidFill>
+                <a:latin typeface="Verdana" charset="0"/>
+                <a:ea typeface="ＭＳ Ｐゴシック" charset="0"/>
+              </a:defRPr>
+            </a:lvl6pPr>
+            <a:lvl7pPr marL="2971800" indent="-228600" eaLnBrk="0" fontAlgn="base" hangingPunct="0">
+              <a:spcBef>
+                <a:spcPct val="0"/>
+              </a:spcBef>
+              <a:spcAft>
+                <a:spcPct val="0"/>
+              </a:spcAft>
+              <a:defRPr sz="2400">
+                <a:solidFill>
+                  <a:schemeClr val="tx1"/>
+                </a:solidFill>
+                <a:latin typeface="Verdana" charset="0"/>
+                <a:ea typeface="ＭＳ Ｐゴシック" charset="0"/>
+              </a:defRPr>
+            </a:lvl7pPr>
+            <a:lvl8pPr marL="3429000" indent="-228600" eaLnBrk="0" fontAlgn="base" hangingPunct="0">
+              <a:spcBef>
+                <a:spcPct val="0"/>
+              </a:spcBef>
+              <a:spcAft>
+                <a:spcPct val="0"/>
+              </a:spcAft>
+              <a:defRPr sz="2400">
+                <a:solidFill>
+                  <a:schemeClr val="tx1"/>
+                </a:solidFill>
+                <a:latin typeface="Verdana" charset="0"/>
+                <a:ea typeface="ＭＳ Ｐゴシック" charset="0"/>
+              </a:defRPr>
+            </a:lvl8pPr>
+            <a:lvl9pPr marL="3886200" indent="-228600" eaLnBrk="0" fontAlgn="base" hangingPunct="0">
+              <a:spcBef>
+                <a:spcPct val="0"/>
+              </a:spcBef>
+              <a:spcAft>
+                <a:spcPct val="0"/>
+              </a:spcAft>
+              <a:defRPr sz="2400">
+                <a:solidFill>
+                  <a:schemeClr val="tx1"/>
+                </a:solidFill>
+                <a:latin typeface="Verdana" charset="0"/>
+                <a:ea typeface="ＭＳ Ｐゴシック" charset="0"/>
+              </a:defRPr>
+            </a:lvl9pPr>
+          </a:lstStyle>
+          <a:p>
+            <a:fld id="{2F106329-1E2C-124D-9538-AF52D439D180}" type="slidenum">
+              <a:rPr lang="de-DE" sz="1200">
+                <a:latin typeface="Andale Mono" charset="0"/>
+              </a:rPr>
+              <a:pPr/>
+              <a:t>14</a:t>
+            </a:fld>
+            <a:endParaRPr lang="de-DE" sz="1200">
+              <a:latin typeface="Andale Mono" charset="0"/>
+            </a:endParaRPr>
+          </a:p>
+        </p:txBody>
+      </p:sp>
+      <p:sp>
+        <p:nvSpPr>
+          <p:cNvPr id="6146" name="Rectangle 2"/>
+          <p:cNvSpPr>
+            <a:spLocks noGrp="1" noRot="1" noChangeAspect="1" noChangeArrowheads="1" noTextEdit="1"/>
           </p:cNvSpPr>
           <p:nvPr>
             <p:ph type="sldImg"/>
           </p:nvPr>
         </p:nvSpPr>
-        <p:spPr/>
+        <p:spPr>
+          <a:ln/>
+        </p:spPr>
       </p:sp>
       <p:sp>
         <p:nvSpPr>
-          <p:cNvPr id="3" name="Notizenplatzhalter 2"/>
+          <p:cNvPr id="6147" name="Rectangle 3"/>
           <p:cNvSpPr>
-            <a:spLocks noGrp="1"/>
+            <a:spLocks noGrp="1" noChangeArrowheads="1"/>
           </p:cNvSpPr>
           <p:nvPr>
             <p:ph type="body" idx="1"/>
           </p:nvPr>
         </p:nvSpPr>
-        <p:spPr/>
+        <p:spPr>
+          <a:noFill/>
+          <a:ln/>
+          <a:extLst>
+            <a:ext uri="{909E8E84-426E-40DD-AFC4-6F175D3DCCD1}">
+              <a14:hiddenFill xmlns:a14="http://schemas.microsoft.com/office/drawing/2010/main">
+                <a:solidFill>
+                  <a:srgbClr val="FFFFFF"/>
+                </a:solidFill>
+              </a14:hiddenFill>
+            </a:ext>
+            <a:ext uri="{91240B29-F687-4F45-9708-019B960494DF}">
+              <a14:hiddenLine xmlns:a14="http://schemas.microsoft.com/office/drawing/2010/main" w="9525">
+                <a:solidFill>
+                  <a:srgbClr val="000000"/>
+                </a:solidFill>
+                <a:miter lim="800000"/>
+                <a:headEnd/>
+                <a:tailEnd/>
+              </a14:hiddenLine>
+            </a:ext>
+          </a:extLst>
+        </p:spPr>
         <p:txBody>
           <a:bodyPr/>
           <a:lstStyle/>
           <a:p>
+            <a:pPr eaLnBrk="1" hangingPunct="1"/>
+            <a:r>
+              <a:rPr lang="de-DE" dirty="0"/>
+              <a:t>Langsam sprechen</a:t>
+            </a:r>
+          </a:p>
+          <a:p>
+            <a:pPr eaLnBrk="1" hangingPunct="1"/>
+            <a:r>
+              <a:rPr lang="de-DE" dirty="0"/>
+              <a:t>Einen Schluck Wasser nehmen, wenn nötig </a:t>
+            </a:r>
+          </a:p>
+          <a:p>
+            <a:pPr eaLnBrk="1" hangingPunct="1"/>
+            <a:r>
+              <a:rPr lang="de-DE" dirty="0"/>
+              <a:t>Körperhaltung: aufrecht</a:t>
+            </a:r>
+          </a:p>
+          <a:p>
+            <a:pPr eaLnBrk="1" hangingPunct="1"/>
+            <a:r>
+              <a:rPr lang="de-DE" dirty="0"/>
+              <a:t>Zu Vortragsbeginn: Schultern gerade, entspannen</a:t>
+            </a:r>
+          </a:p>
+          <a:p>
+            <a:pPr eaLnBrk="1" hangingPunct="1"/>
             <a:endParaRPr lang="de-DE" dirty="0"/>
-          </a:p>
-        </p:txBody>
-      </p:sp>
-      <p:sp>
-        <p:nvSpPr>
-          <p:cNvPr id="4" name="Foliennummernplatzhalter 3"/>
-          <p:cNvSpPr>
-            <a:spLocks noGrp="1"/>
-          </p:cNvSpPr>
-          <p:nvPr>
-            <p:ph type="sldNum" sz="quarter" idx="10"/>
-          </p:nvPr>
-        </p:nvSpPr>
-        <p:spPr/>
-        <p:txBody>
-          <a:bodyPr/>
-          <a:lstStyle/>
-          <a:p>
-            <a:pPr>
-              <a:defRPr/>
-            </a:pPr>
-            <a:fld id="{9DDC5E44-63C0-EF42-9B94-8202B4B6C3D9}" type="slidenum">
-              <a:rPr lang="de-DE" smtClean="0"/>
-              <a:pPr>
-                <a:defRPr/>
-              </a:pPr>
-              <a:t>9</a:t>
-            </a:fld>
-            <a:endParaRPr lang="de-DE"/>
           </a:p>
         </p:txBody>
       </p:sp>
     </p:spTree>
-    <p:extLst>
-      <p:ext uri="{BB962C8B-B14F-4D97-AF65-F5344CB8AC3E}">
-        <p14:creationId xmlns:p14="http://schemas.microsoft.com/office/powerpoint/2010/main" val="2854611297"/>
-      </p:ext>
-    </p:extLst>
   </p:cSld>
   <p:clrMapOvr>
     <a:masterClrMapping/>
@@ -3649,7 +3649,7 @@
               </a14:hiddenLine>
             </a:ext>
             <a:ext uri="{FAA26D3D-D897-4be2-8F04-BA451C77F1D7}">
-              <ma14:placeholderFlag xmlns="" xmlns:ma14="http://schemas.microsoft.com/office/mac/drawingml/2011/main" val="1"/>
+              <ma14:placeholderFlag xmlns:ma14="http://schemas.microsoft.com/office/mac/drawingml/2011/main" xmlns="" val="1"/>
             </a:ext>
           </a:extLst>
         </p:spPr>
@@ -3710,7 +3710,7 @@
               </a14:hiddenLine>
             </a:ext>
             <a:ext uri="{FAA26D3D-D897-4be2-8F04-BA451C77F1D7}">
-              <ma14:placeholderFlag xmlns="" xmlns:ma14="http://schemas.microsoft.com/office/mac/drawingml/2011/main" val="1"/>
+              <ma14:placeholderFlag xmlns:ma14="http://schemas.microsoft.com/office/mac/drawingml/2011/main" xmlns="" val="1"/>
             </a:ext>
           </a:extLst>
         </p:spPr>
@@ -4554,17 +4554,89 @@
           <a:lstStyle/>
           <a:p>
             <a:r>
-              <a:rPr lang="de-DE" dirty="0"/>
-              <a:t>Datenschutzfreundliche Speicherung unternehmensinterner Überwachungsdaten mittels </a:t>
-            </a:r>
-            <a:r>
-              <a:rPr lang="de-DE" dirty="0" err="1"/>
-              <a:t>Pseudonymisierung</a:t>
-            </a:r>
-            <a:r>
-              <a:rPr lang="de-DE" dirty="0"/>
-              <a:t> und kryptographischer Schwellwertschemata</a:t>
-            </a:r>
+              <a:rPr lang="de-DE" dirty="0" smtClean="0"/>
+              <a:t>Privacy-</a:t>
+            </a:r>
+            <a:r>
+              <a:rPr lang="de-DE" dirty="0" err="1" smtClean="0"/>
+              <a:t>preserving</a:t>
+            </a:r>
+            <a:r>
+              <a:rPr lang="de-DE" dirty="0" smtClean="0"/>
+              <a:t> </a:t>
+            </a:r>
+            <a:r>
+              <a:rPr lang="de-DE" dirty="0" err="1" smtClean="0"/>
+              <a:t>storage</a:t>
+            </a:r>
+            <a:r>
+              <a:rPr lang="de-DE" dirty="0" smtClean="0"/>
+              <a:t> </a:t>
+            </a:r>
+            <a:r>
+              <a:rPr lang="de-DE" dirty="0" err="1" smtClean="0"/>
+              <a:t>of</a:t>
+            </a:r>
+            <a:r>
+              <a:rPr lang="de-DE" dirty="0" smtClean="0"/>
+              <a:t> </a:t>
+            </a:r>
+            <a:r>
+              <a:rPr lang="de-DE" dirty="0" err="1" smtClean="0"/>
+              <a:t>enterprise</a:t>
+            </a:r>
+            <a:r>
+              <a:rPr lang="de-DE" dirty="0" smtClean="0"/>
+              <a:t> </a:t>
+            </a:r>
+            <a:r>
+              <a:rPr lang="de-DE" dirty="0" err="1" smtClean="0"/>
+              <a:t>logdata</a:t>
+            </a:r>
+            <a:r>
+              <a:rPr lang="de-DE" dirty="0" smtClean="0"/>
+              <a:t> </a:t>
+            </a:r>
+            <a:r>
+              <a:rPr lang="de-DE" dirty="0" err="1" smtClean="0"/>
+              <a:t>using</a:t>
+            </a:r>
+            <a:r>
+              <a:rPr lang="de-DE" dirty="0" smtClean="0"/>
+              <a:t> </a:t>
+            </a:r>
+            <a:r>
+              <a:rPr lang="de-DE" dirty="0" err="1" smtClean="0"/>
+              <a:t>pseudonymisation</a:t>
+            </a:r>
+            <a:r>
+              <a:rPr lang="de-DE" dirty="0" smtClean="0"/>
+              <a:t> </a:t>
+            </a:r>
+            <a:r>
+              <a:rPr lang="de-DE" dirty="0" err="1" smtClean="0"/>
+              <a:t>and</a:t>
+            </a:r>
+            <a:r>
+              <a:rPr lang="de-DE" dirty="0" smtClean="0"/>
+              <a:t> </a:t>
+            </a:r>
+            <a:br>
+              <a:rPr lang="de-DE" dirty="0" smtClean="0"/>
+            </a:br>
+            <a:r>
+              <a:rPr lang="de-DE" dirty="0" err="1" smtClean="0"/>
+              <a:t>threshold</a:t>
+            </a:r>
+            <a:r>
+              <a:rPr lang="de-DE" dirty="0" smtClean="0"/>
+              <a:t> </a:t>
+            </a:r>
+            <a:r>
+              <a:rPr lang="de-DE" dirty="0" err="1" smtClean="0"/>
+              <a:t>cryptosystems</a:t>
+            </a:r>
+            <a:endParaRPr lang="de-DE" dirty="0"/>
           </a:p>
         </p:txBody>
       </p:sp>
@@ -4635,6 +4707,11 @@
         </p:txBody>
       </p:sp>
     </p:spTree>
+    <p:extLst>
+      <p:ext uri="{BB962C8B-B14F-4D97-AF65-F5344CB8AC3E}">
+        <p14:creationId xmlns:p14="http://schemas.microsoft.com/office/powerpoint/2010/main" val="3282376691"/>
+      </p:ext>
+    </p:extLst>
   </p:cSld>
   <p:clrMapOvr>
     <a:masterClrMapping/>
@@ -4682,205 +4759,6 @@
           <a:lstStyle/>
           <a:p>
             <a:r>
-              <a:rPr lang="de-DE" dirty="0" err="1" smtClean="0"/>
-              <a:t>Identifying</a:t>
-            </a:r>
-            <a:r>
-              <a:rPr lang="de-DE" dirty="0" smtClean="0"/>
-              <a:t> </a:t>
-            </a:r>
-            <a:r>
-              <a:rPr lang="de-DE" dirty="0" err="1" smtClean="0"/>
-              <a:t>created</a:t>
-            </a:r>
-            <a:r>
-              <a:rPr lang="de-DE" dirty="0" smtClean="0"/>
-              <a:t> </a:t>
-            </a:r>
-            <a:r>
-              <a:rPr lang="de-DE" dirty="0" err="1" smtClean="0"/>
-              <a:t>pseudonyms</a:t>
-            </a:r>
-            <a:endParaRPr lang="de-DE" dirty="0"/>
-          </a:p>
-        </p:txBody>
-      </p:sp>
-      <p:sp>
-        <p:nvSpPr>
-          <p:cNvPr id="3" name="Inhaltsplatzhalter 2"/>
-          <p:cNvSpPr>
-            <a:spLocks noGrp="1"/>
-          </p:cNvSpPr>
-          <p:nvPr>
-            <p:ph idx="1"/>
-          </p:nvPr>
-        </p:nvSpPr>
-        <p:spPr>
-          <a:xfrm>
-            <a:off x="3023828" y="4040832"/>
-            <a:ext cx="3096344" cy="2484512"/>
-          </a:xfrm>
-        </p:spPr>
-        <p:txBody>
-          <a:bodyPr/>
-          <a:lstStyle/>
-          <a:p>
-            <a:r>
-              <a:rPr lang="de-DE" dirty="0" err="1"/>
-              <a:t>Local</a:t>
-            </a:r>
-            <a:r>
-              <a:rPr lang="de-DE" dirty="0"/>
-              <a:t> </a:t>
-            </a:r>
-            <a:r>
-              <a:rPr lang="de-DE" dirty="0" err="1" smtClean="0"/>
-              <a:t>storage</a:t>
-            </a:r>
-            <a:endParaRPr lang="de-DE" strike="sngStrike" dirty="0" smtClean="0"/>
-          </a:p>
-          <a:p>
-            <a:r>
-              <a:rPr lang="de-DE" strike="sngStrike" dirty="0" err="1" smtClean="0"/>
-              <a:t>Decryption</a:t>
-            </a:r>
-            <a:endParaRPr lang="de-DE" strike="sngStrike" dirty="0" smtClean="0"/>
-          </a:p>
-          <a:p>
-            <a:r>
-              <a:rPr lang="de-DE" strike="sngStrike" dirty="0" err="1" smtClean="0"/>
-              <a:t>Deterministic</a:t>
-            </a:r>
-            <a:r>
-              <a:rPr lang="de-DE" strike="sngStrike" dirty="0" smtClean="0"/>
-              <a:t> </a:t>
-            </a:r>
-            <a:r>
-              <a:rPr lang="de-DE" strike="sngStrike" dirty="0" err="1" smtClean="0"/>
-              <a:t>encryption</a:t>
-            </a:r>
-            <a:endParaRPr lang="de-DE" strike="sngStrike" dirty="0"/>
-          </a:p>
-          <a:p>
-            <a:r>
-              <a:rPr lang="de-DE" strike="sngStrike" dirty="0" err="1" smtClean="0"/>
-              <a:t>Hashing</a:t>
-            </a:r>
-            <a:endParaRPr lang="de-DE" strike="sngStrike" dirty="0" smtClean="0"/>
-          </a:p>
-          <a:p>
-            <a:r>
-              <a:rPr lang="de-DE" b="1" dirty="0" smtClean="0"/>
-              <a:t>MACs</a:t>
-            </a:r>
-          </a:p>
-          <a:p>
-            <a:r>
-              <a:rPr lang="de-DE" dirty="0" err="1" smtClean="0"/>
-              <a:t>Searchable</a:t>
-            </a:r>
-            <a:r>
-              <a:rPr lang="de-DE" dirty="0" smtClean="0"/>
-              <a:t> </a:t>
-            </a:r>
-            <a:r>
-              <a:rPr lang="de-DE" dirty="0" err="1" smtClean="0"/>
-              <a:t>encryption</a:t>
-            </a:r>
-            <a:endParaRPr lang="de-DE" dirty="0" smtClean="0"/>
-          </a:p>
-          <a:p>
-            <a:endParaRPr lang="de-DE" dirty="0"/>
-          </a:p>
-        </p:txBody>
-      </p:sp>
-      <p:pic>
-        <p:nvPicPr>
-          <p:cNvPr id="17410" name="Picture 2" descr="C:\Users\m3\Entwicklung\git\master-thesis\thesis\dia\se_overview.png"/>
-          <p:cNvPicPr>
-            <a:picLocks noChangeAspect="1" noChangeArrowheads="1"/>
-          </p:cNvPicPr>
-          <p:nvPr/>
-        </p:nvPicPr>
-        <p:blipFill>
-          <a:blip r:embed="rId2">
-            <a:extLst>
-              <a:ext uri="{28A0092B-C50C-407E-A947-70E740481C1C}">
-                <a14:useLocalDpi xmlns:a14="http://schemas.microsoft.com/office/drawing/2010/main" val="0"/>
-              </a:ext>
-            </a:extLst>
-          </a:blip>
-          <a:srcRect/>
-          <a:stretch>
-            <a:fillRect/>
-          </a:stretch>
-        </p:blipFill>
-        <p:spPr bwMode="auto">
-          <a:xfrm>
-            <a:off x="1554522" y="1628800"/>
-            <a:ext cx="6034956" cy="2266799"/>
-          </a:xfrm>
-          <a:prstGeom prst="rect">
-            <a:avLst/>
-          </a:prstGeom>
-          <a:noFill/>
-          <a:extLst>
-            <a:ext uri="{909E8E84-426E-40DD-AFC4-6F175D3DCCD1}">
-              <a14:hiddenFill xmlns:a14="http://schemas.microsoft.com/office/drawing/2010/main">
-                <a:solidFill>
-                  <a:srgbClr val="FFFFFF"/>
-                </a:solidFill>
-              </a14:hiddenFill>
-            </a:ext>
-          </a:extLst>
-        </p:spPr>
-      </p:pic>
-    </p:spTree>
-    <p:extLst>
-      <p:ext uri="{BB962C8B-B14F-4D97-AF65-F5344CB8AC3E}">
-        <p14:creationId xmlns:p14="http://schemas.microsoft.com/office/powerpoint/2010/main" val="3862439232"/>
-      </p:ext>
-    </p:extLst>
-  </p:cSld>
-  <p:clrMapOvr>
-    <a:masterClrMapping/>
-  </p:clrMapOvr>
-</p:sld>
-</file>
-
-<file path=ppt/slides/slide11.xml><?xml version="1.0" encoding="utf-8"?>
-<p:sld xmlns:a="http://schemas.openxmlformats.org/drawingml/2006/main" xmlns:r="http://schemas.openxmlformats.org/officeDocument/2006/relationships" xmlns:p="http://schemas.openxmlformats.org/presentationml/2006/main">
-  <p:cSld>
-    <p:spTree>
-      <p:nvGrpSpPr>
-        <p:cNvPr id="1" name=""/>
-        <p:cNvGrpSpPr/>
-        <p:nvPr/>
-      </p:nvGrpSpPr>
-      <p:grpSpPr>
-        <a:xfrm>
-          <a:off x="0" y="0"/>
-          <a:ext cx="0" cy="0"/>
-          <a:chOff x="0" y="0"/>
-          <a:chExt cx="0" cy="0"/>
-        </a:xfrm>
-      </p:grpSpPr>
-      <p:sp>
-        <p:nvSpPr>
-          <p:cNvPr id="2" name="Titel 1"/>
-          <p:cNvSpPr>
-            <a:spLocks noGrp="1"/>
-          </p:cNvSpPr>
-          <p:nvPr>
-            <p:ph type="title"/>
-          </p:nvPr>
-        </p:nvSpPr>
-        <p:spPr/>
-        <p:txBody>
-          <a:bodyPr/>
-          <a:lstStyle/>
-          <a:p>
-            <a:r>
               <a:rPr lang="de-DE" dirty="0" smtClean="0"/>
               <a:t>Evaluation (I) - </a:t>
             </a:r>
@@ -5042,7 +4920,7 @@
 </p:sld>
 </file>
 
-<file path=ppt/slides/slide12.xml><?xml version="1.0" encoding="utf-8"?>
+<file path=ppt/slides/slide11.xml><?xml version="1.0" encoding="utf-8"?>
 <p:sld xmlns:a="http://schemas.openxmlformats.org/drawingml/2006/main" xmlns:r="http://schemas.openxmlformats.org/officeDocument/2006/relationships" xmlns:p="http://schemas.openxmlformats.org/presentationml/2006/main">
   <p:cSld>
     <p:spTree>
@@ -5190,7 +5068,7 @@
 </p:sld>
 </file>
 
-<file path=ppt/slides/slide13.xml><?xml version="1.0" encoding="utf-8"?>
+<file path=ppt/slides/slide12.xml><?xml version="1.0" encoding="utf-8"?>
 <p:sld xmlns:a="http://schemas.openxmlformats.org/drawingml/2006/main" xmlns:r="http://schemas.openxmlformats.org/officeDocument/2006/relationships" xmlns:p="http://schemas.openxmlformats.org/presentationml/2006/main">
   <p:cSld>
     <p:spTree>
@@ -5602,7 +5480,7 @@
 </p:sld>
 </file>
 
-<file path=ppt/slides/slide14.xml><?xml version="1.0" encoding="utf-8"?>
+<file path=ppt/slides/slide13.xml><?xml version="1.0" encoding="utf-8"?>
 <p:sld xmlns:a="http://schemas.openxmlformats.org/drawingml/2006/main" xmlns:r="http://schemas.openxmlformats.org/officeDocument/2006/relationships" xmlns:p="http://schemas.openxmlformats.org/presentationml/2006/main">
   <p:cSld>
     <p:spTree>
@@ -5667,6 +5545,134 @@
   <p:clrMapOvr>
     <a:masterClrMapping/>
   </p:clrMapOvr>
+</p:sld>
+</file>
+
+<file path=ppt/slides/slide14.xml><?xml version="1.0" encoding="utf-8"?>
+<p:sld xmlns:a="http://schemas.openxmlformats.org/drawingml/2006/main" xmlns:r="http://schemas.openxmlformats.org/officeDocument/2006/relationships" xmlns:p="http://schemas.openxmlformats.org/presentationml/2006/main">
+  <p:cSld>
+    <p:spTree>
+      <p:nvGrpSpPr>
+        <p:cNvPr id="1" name=""/>
+        <p:cNvGrpSpPr/>
+        <p:nvPr/>
+      </p:nvGrpSpPr>
+      <p:grpSpPr>
+        <a:xfrm>
+          <a:off x="0" y="0"/>
+          <a:ext cx="0" cy="0"/>
+          <a:chOff x="0" y="0"/>
+          <a:chExt cx="0" cy="0"/>
+        </a:xfrm>
+      </p:grpSpPr>
+      <p:sp>
+        <p:nvSpPr>
+          <p:cNvPr id="5121" name="Rectangle 7"/>
+          <p:cNvSpPr>
+            <a:spLocks noGrp="1" noChangeArrowheads="1"/>
+          </p:cNvSpPr>
+          <p:nvPr>
+            <p:ph type="ctrTitle"/>
+          </p:nvPr>
+        </p:nvSpPr>
+        <p:spPr/>
+        <p:txBody>
+          <a:bodyPr/>
+          <a:lstStyle/>
+          <a:p>
+            <a:r>
+              <a:rPr lang="de-DE" dirty="0"/>
+              <a:t>Datenschutzfreundliche Speicherung unternehmensinterner Überwachungsdaten mittels </a:t>
+            </a:r>
+            <a:r>
+              <a:rPr lang="de-DE" dirty="0" err="1"/>
+              <a:t>Pseudonymisierung</a:t>
+            </a:r>
+            <a:r>
+              <a:rPr lang="de-DE" dirty="0"/>
+              <a:t> und kryptographischer Schwellwertschemata</a:t>
+            </a:r>
+          </a:p>
+        </p:txBody>
+      </p:sp>
+      <p:sp>
+        <p:nvSpPr>
+          <p:cNvPr id="5122" name="Rectangle 8"/>
+          <p:cNvSpPr>
+            <a:spLocks noGrp="1" noChangeArrowheads="1"/>
+          </p:cNvSpPr>
+          <p:nvPr>
+            <p:ph type="subTitle" idx="1"/>
+          </p:nvPr>
+        </p:nvSpPr>
+        <p:spPr/>
+        <p:txBody>
+          <a:bodyPr/>
+          <a:lstStyle/>
+          <a:p>
+            <a:pPr>
+              <a:spcAft>
+                <a:spcPts val="1800"/>
+              </a:spcAft>
+            </a:pPr>
+            <a:r>
+              <a:rPr lang="de-DE" dirty="0" smtClean="0"/>
+              <a:t>Tom Petersen</a:t>
+            </a:r>
+            <a:endParaRPr lang="de-DE" dirty="0"/>
+          </a:p>
+          <a:p>
+            <a:r>
+              <a:rPr lang="de-DE" dirty="0" smtClean="0"/>
+              <a:t>Universität Hamburg</a:t>
+            </a:r>
+          </a:p>
+          <a:p>
+            <a:r>
+              <a:rPr lang="de-DE" dirty="0" smtClean="0"/>
+              <a:t>Fachbereich Informatik</a:t>
+            </a:r>
+          </a:p>
+          <a:p>
+            <a:endParaRPr lang="de-DE" dirty="0" smtClean="0"/>
+          </a:p>
+        </p:txBody>
+      </p:sp>
+      <p:sp>
+        <p:nvSpPr>
+          <p:cNvPr id="5123" name="Textplatzhalter 11"/>
+          <p:cNvSpPr>
+            <a:spLocks noGrp="1"/>
+          </p:cNvSpPr>
+          <p:nvPr>
+            <p:ph type="body" sz="quarter" idx="13"/>
+          </p:nvPr>
+        </p:nvSpPr>
+        <p:spPr/>
+        <p:txBody>
+          <a:bodyPr/>
+          <a:lstStyle/>
+          <a:p>
+            <a:r>
+              <a:rPr lang="de-DE" dirty="0" smtClean="0"/>
+              <a:t>20. März 2018</a:t>
+            </a:r>
+            <a:endParaRPr lang="de-DE" dirty="0"/>
+          </a:p>
+        </p:txBody>
+      </p:sp>
+    </p:spTree>
+  </p:cSld>
+  <p:clrMapOvr>
+    <a:masterClrMapping/>
+  </p:clrMapOvr>
+  <p:timing>
+    <p:tnLst>
+      <p:par>
+        <p:cTn id="1" dur="indefinite" restart="never" nodeType="tmRoot"/>
+      </p:par>
+    </p:tnLst>
+  </p:timing>
 </p:sld>
 </file>
 
@@ -6117,11 +6123,7 @@
             </a:r>
             <a:r>
               <a:rPr lang="de-DE" dirty="0" smtClean="0"/>
-              <a:t> </a:t>
-            </a:r>
-            <a:r>
-              <a:rPr lang="de-DE" dirty="0" smtClean="0"/>
-              <a:t>on</a:t>
+              <a:t> on</a:t>
             </a:r>
           </a:p>
           <a:p>
@@ -6481,12 +6483,12 @@
       </p:grpSpPr>
       <p:sp>
         <p:nvSpPr>
-          <p:cNvPr id="5121" name="Rectangle 7"/>
+          <p:cNvPr id="2" name="Titel 1"/>
           <p:cNvSpPr>
-            <a:spLocks noGrp="1" noChangeArrowheads="1"/>
+            <a:spLocks noGrp="1"/>
           </p:cNvSpPr>
           <p:nvPr>
-            <p:ph type="ctrTitle"/>
+            <p:ph type="title"/>
           </p:nvPr>
         </p:nvSpPr>
         <p:spPr/>
@@ -6496,86 +6498,7 @@
           <a:p>
             <a:r>
               <a:rPr lang="de-DE" dirty="0" smtClean="0"/>
-              <a:t>Privacy-</a:t>
-            </a:r>
-            <a:r>
-              <a:rPr lang="de-DE" dirty="0" err="1" smtClean="0"/>
-              <a:t>preserving</a:t>
-            </a:r>
-            <a:r>
-              <a:rPr lang="de-DE" dirty="0" smtClean="0"/>
-              <a:t> </a:t>
-            </a:r>
-            <a:r>
-              <a:rPr lang="de-DE" dirty="0" err="1" smtClean="0"/>
-              <a:t>storage</a:t>
-            </a:r>
-            <a:r>
-              <a:rPr lang="de-DE" dirty="0" smtClean="0"/>
-              <a:t> </a:t>
-            </a:r>
-            <a:r>
-              <a:rPr lang="de-DE" dirty="0" err="1" smtClean="0"/>
-              <a:t>of</a:t>
-            </a:r>
-            <a:r>
-              <a:rPr lang="de-DE" dirty="0" smtClean="0"/>
-              <a:t> </a:t>
-            </a:r>
-            <a:r>
-              <a:rPr lang="de-DE" dirty="0" err="1" smtClean="0"/>
-              <a:t>enterprise</a:t>
-            </a:r>
-            <a:r>
-              <a:rPr lang="de-DE" dirty="0" smtClean="0"/>
-              <a:t> </a:t>
-            </a:r>
-            <a:r>
-              <a:rPr lang="de-DE" dirty="0" err="1" smtClean="0"/>
-              <a:t>logdata</a:t>
-            </a:r>
-            <a:r>
-              <a:rPr lang="de-DE" dirty="0" smtClean="0"/>
-              <a:t> </a:t>
-            </a:r>
-            <a:r>
-              <a:rPr lang="de-DE" dirty="0" err="1" smtClean="0"/>
-              <a:t>using</a:t>
-            </a:r>
-            <a:r>
-              <a:rPr lang="de-DE" dirty="0" smtClean="0"/>
-              <a:t> </a:t>
-            </a:r>
-            <a:r>
-              <a:rPr lang="de-DE" dirty="0" err="1" smtClean="0"/>
-              <a:t>pseudonymisation</a:t>
-            </a:r>
-            <a:r>
-              <a:rPr lang="de-DE" dirty="0" smtClean="0"/>
-              <a:t> </a:t>
-            </a:r>
-            <a:r>
-              <a:rPr lang="de-DE" dirty="0" err="1" smtClean="0"/>
-              <a:t>and</a:t>
-            </a:r>
-            <a:r>
-              <a:rPr lang="de-DE" dirty="0" smtClean="0"/>
-              <a:t> </a:t>
-            </a:r>
-            <a:br>
-              <a:rPr lang="de-DE" dirty="0" smtClean="0"/>
-            </a:br>
-            <a:r>
-              <a:rPr lang="de-DE" dirty="0" err="1" smtClean="0"/>
-              <a:t>threshold</a:t>
-            </a:r>
-            <a:r>
-              <a:rPr lang="de-DE" dirty="0" smtClean="0"/>
-              <a:t> </a:t>
-            </a:r>
-            <a:r>
-              <a:rPr lang="de-DE" dirty="0" err="1" smtClean="0"/>
-              <a:t>cryptosystems</a:t>
+              <a:t>Agenda</a:t>
             </a:r>
             <a:endParaRPr lang="de-DE" dirty="0"/>
           </a:p>
@@ -6583,12 +6506,12 @@
       </p:sp>
       <p:sp>
         <p:nvSpPr>
-          <p:cNvPr id="5122" name="Rectangle 8"/>
+          <p:cNvPr id="3" name="Inhaltsplatzhalter 2"/>
           <p:cNvSpPr>
-            <a:spLocks noGrp="1" noChangeArrowheads="1"/>
+            <a:spLocks noGrp="1"/>
           </p:cNvSpPr>
           <p:nvPr>
-            <p:ph type="subTitle" idx="1"/>
+            <p:ph idx="1"/>
           </p:nvPr>
         </p:nvSpPr>
         <p:spPr/>
@@ -6596,53 +6519,122 @@
           <a:bodyPr/>
           <a:lstStyle/>
           <a:p>
-            <a:pPr>
-              <a:spcAft>
-                <a:spcPts val="1800"/>
-              </a:spcAft>
+            <a:pPr marL="457200" indent="-457200">
+              <a:buFont typeface="+mj-lt"/>
+              <a:buAutoNum type="arabicPeriod"/>
             </a:pPr>
             <a:r>
               <a:rPr lang="de-DE" dirty="0" smtClean="0"/>
-              <a:t>Tom Petersen</a:t>
-            </a:r>
-            <a:endParaRPr lang="de-DE" dirty="0"/>
-          </a:p>
-          <a:p>
-            <a:r>
-              <a:rPr lang="de-DE" dirty="0" smtClean="0"/>
-              <a:t>Universität Hamburg</a:t>
-            </a:r>
-          </a:p>
-          <a:p>
-            <a:r>
-              <a:rPr lang="de-DE" dirty="0" smtClean="0"/>
-              <a:t>Fachbereich Informatik</a:t>
-            </a:r>
-          </a:p>
-          <a:p>
+              <a:t>Motivation</a:t>
+            </a:r>
+          </a:p>
+          <a:p>
+            <a:pPr marL="457200" indent="-457200">
+              <a:buFont typeface="+mj-lt"/>
+              <a:buAutoNum type="arabicPeriod"/>
+            </a:pPr>
+            <a:r>
+              <a:rPr lang="de-DE" dirty="0" smtClean="0"/>
+              <a:t>Approach</a:t>
+            </a:r>
+          </a:p>
+          <a:p>
+            <a:pPr marL="457200" indent="-457200">
+              <a:buFont typeface="+mj-lt"/>
+              <a:buAutoNum type="arabicPeriod"/>
+            </a:pPr>
+            <a:r>
+              <a:rPr lang="de-DE" dirty="0" err="1" smtClean="0"/>
+              <a:t>Conceptual</a:t>
+            </a:r>
+            <a:r>
+              <a:rPr lang="de-DE" dirty="0" smtClean="0"/>
+              <a:t> design</a:t>
+            </a:r>
+          </a:p>
+          <a:p>
+            <a:pPr marL="857250" lvl="1" indent="-457200">
+              <a:buFont typeface="+mj-lt"/>
+              <a:buAutoNum type="arabicPeriod"/>
+            </a:pPr>
+            <a:r>
+              <a:rPr lang="de-DE" dirty="0" err="1" smtClean="0"/>
+              <a:t>Pseudonymisation</a:t>
+            </a:r>
             <a:endParaRPr lang="de-DE" dirty="0" smtClean="0"/>
           </a:p>
-        </p:txBody>
-      </p:sp>
-      <p:sp>
-        <p:nvSpPr>
-          <p:cNvPr id="5123" name="Textplatzhalter 11"/>
-          <p:cNvSpPr>
-            <a:spLocks noGrp="1"/>
-          </p:cNvSpPr>
-          <p:nvPr>
-            <p:ph type="body" sz="quarter" idx="13"/>
-          </p:nvPr>
-        </p:nvSpPr>
-        <p:spPr/>
-        <p:txBody>
-          <a:bodyPr/>
-          <a:lstStyle/>
-          <a:p>
-            <a:r>
-              <a:rPr lang="de-DE" dirty="0" smtClean="0"/>
-              <a:t>20. März 2018</a:t>
-            </a:r>
+          <a:p>
+            <a:pPr marL="857250" lvl="1" indent="-457200">
+              <a:buFont typeface="+mj-lt"/>
+              <a:buAutoNum type="arabicPeriod"/>
+            </a:pPr>
+            <a:r>
+              <a:rPr lang="de-DE" dirty="0" err="1" smtClean="0"/>
+              <a:t>Threshold</a:t>
+            </a:r>
+            <a:r>
+              <a:rPr lang="de-DE" dirty="0" smtClean="0"/>
+              <a:t> </a:t>
+            </a:r>
+            <a:r>
+              <a:rPr lang="de-DE" dirty="0" err="1" smtClean="0"/>
+              <a:t>cryptosystem</a:t>
+            </a:r>
+            <a:endParaRPr lang="de-DE" dirty="0" smtClean="0"/>
+          </a:p>
+          <a:p>
+            <a:pPr marL="857250" lvl="1" indent="-457200">
+              <a:buFont typeface="+mj-lt"/>
+              <a:buAutoNum type="arabicPeriod"/>
+            </a:pPr>
+            <a:r>
+              <a:rPr lang="de-DE" dirty="0" err="1"/>
+              <a:t>Identifying</a:t>
+            </a:r>
+            <a:r>
+              <a:rPr lang="de-DE" dirty="0"/>
+              <a:t> </a:t>
+            </a:r>
+            <a:r>
+              <a:rPr lang="de-DE" dirty="0" err="1"/>
+              <a:t>created</a:t>
+            </a:r>
+            <a:r>
+              <a:rPr lang="de-DE" dirty="0"/>
+              <a:t> </a:t>
+            </a:r>
+            <a:r>
+              <a:rPr lang="de-DE" dirty="0" err="1" smtClean="0"/>
+              <a:t>pseudonyms</a:t>
+            </a:r>
+            <a:endParaRPr lang="de-DE" dirty="0" smtClean="0"/>
+          </a:p>
+          <a:p>
+            <a:pPr marL="457200" indent="-457200">
+              <a:buFont typeface="+mj-lt"/>
+              <a:buAutoNum type="arabicPeriod"/>
+            </a:pPr>
+            <a:r>
+              <a:rPr lang="de-DE" dirty="0" smtClean="0"/>
+              <a:t>Evaluation</a:t>
+            </a:r>
+          </a:p>
+          <a:p>
+            <a:pPr marL="457200" indent="-457200">
+              <a:buFont typeface="+mj-lt"/>
+              <a:buAutoNum type="arabicPeriod"/>
+            </a:pPr>
+            <a:r>
+              <a:rPr lang="de-DE" dirty="0" err="1" smtClean="0"/>
+              <a:t>Conclusion</a:t>
+            </a:r>
+            <a:endParaRPr lang="de-DE" dirty="0" smtClean="0"/>
+          </a:p>
+          <a:p>
+            <a:pPr marL="457200" indent="-457200">
+              <a:buFont typeface="+mj-lt"/>
+              <a:buAutoNum type="arabicPeriod"/>
+            </a:pPr>
             <a:endParaRPr lang="de-DE" dirty="0"/>
           </a:p>
         </p:txBody>
@@ -6650,20 +6642,13 @@
     </p:spTree>
     <p:extLst>
       <p:ext uri="{BB962C8B-B14F-4D97-AF65-F5344CB8AC3E}">
-        <p14:creationId xmlns:p14="http://schemas.microsoft.com/office/powerpoint/2010/main" val="3282376691"/>
+        <p14:creationId xmlns:p14="http://schemas.microsoft.com/office/powerpoint/2010/main" val="3481102364"/>
       </p:ext>
     </p:extLst>
   </p:cSld>
   <p:clrMapOvr>
     <a:masterClrMapping/>
   </p:clrMapOvr>
-  <p:timing>
-    <p:tnLst>
-      <p:par>
-        <p:cTn id="1" dur="indefinite" restart="never" nodeType="tmRoot"/>
-      </p:par>
-    </p:tnLst>
-  </p:timing>
 </p:sld>
 </file>
 
@@ -6700,194 +6685,6 @@
           <a:lstStyle/>
           <a:p>
             <a:r>
-              <a:rPr lang="de-DE" dirty="0" smtClean="0"/>
-              <a:t>Agenda</a:t>
-            </a:r>
-            <a:endParaRPr lang="de-DE" dirty="0"/>
-          </a:p>
-        </p:txBody>
-      </p:sp>
-      <p:sp>
-        <p:nvSpPr>
-          <p:cNvPr id="3" name="Inhaltsplatzhalter 2"/>
-          <p:cNvSpPr>
-            <a:spLocks noGrp="1"/>
-          </p:cNvSpPr>
-          <p:nvPr>
-            <p:ph idx="1"/>
-          </p:nvPr>
-        </p:nvSpPr>
-        <p:spPr/>
-        <p:txBody>
-          <a:bodyPr/>
-          <a:lstStyle/>
-          <a:p>
-            <a:pPr marL="457200" indent="-457200">
-              <a:buFont typeface="+mj-lt"/>
-              <a:buAutoNum type="arabicPeriod"/>
-            </a:pPr>
-            <a:r>
-              <a:rPr lang="de-DE" dirty="0" smtClean="0"/>
-              <a:t>Motivation</a:t>
-            </a:r>
-          </a:p>
-          <a:p>
-            <a:pPr marL="457200" indent="-457200">
-              <a:buFont typeface="+mj-lt"/>
-              <a:buAutoNum type="arabicPeriod"/>
-            </a:pPr>
-            <a:r>
-              <a:rPr lang="de-DE" dirty="0" smtClean="0"/>
-              <a:t>Approach</a:t>
-            </a:r>
-          </a:p>
-          <a:p>
-            <a:pPr marL="457200" indent="-457200">
-              <a:buFont typeface="+mj-lt"/>
-              <a:buAutoNum type="arabicPeriod"/>
-            </a:pPr>
-            <a:r>
-              <a:rPr lang="de-DE" dirty="0" err="1" smtClean="0"/>
-              <a:t>Conceptual</a:t>
-            </a:r>
-            <a:r>
-              <a:rPr lang="de-DE" dirty="0" smtClean="0"/>
-              <a:t> design</a:t>
-            </a:r>
-          </a:p>
-          <a:p>
-            <a:pPr marL="857250" lvl="1" indent="-457200">
-              <a:buFont typeface="+mj-lt"/>
-              <a:buAutoNum type="arabicPeriod"/>
-            </a:pPr>
-            <a:r>
-              <a:rPr lang="de-DE" dirty="0" err="1" smtClean="0"/>
-              <a:t>Pseudonymisation</a:t>
-            </a:r>
-            <a:endParaRPr lang="de-DE" dirty="0" smtClean="0"/>
-          </a:p>
-          <a:p>
-            <a:pPr marL="857250" lvl="1" indent="-457200">
-              <a:buFont typeface="+mj-lt"/>
-              <a:buAutoNum type="arabicPeriod"/>
-            </a:pPr>
-            <a:r>
-              <a:rPr lang="de-DE" dirty="0" err="1" smtClean="0"/>
-              <a:t>Threshold</a:t>
-            </a:r>
-            <a:r>
-              <a:rPr lang="de-DE" dirty="0" smtClean="0"/>
-              <a:t> </a:t>
-            </a:r>
-            <a:r>
-              <a:rPr lang="de-DE" dirty="0" err="1" smtClean="0"/>
-              <a:t>cryptosystem</a:t>
-            </a:r>
-            <a:endParaRPr lang="de-DE" dirty="0" smtClean="0"/>
-          </a:p>
-          <a:p>
-            <a:pPr marL="857250" lvl="1" indent="-457200">
-              <a:buFont typeface="+mj-lt"/>
-              <a:buAutoNum type="arabicPeriod"/>
-            </a:pPr>
-            <a:r>
-              <a:rPr lang="de-DE" dirty="0" err="1"/>
-              <a:t>Identifying</a:t>
-            </a:r>
-            <a:r>
-              <a:rPr lang="de-DE" dirty="0"/>
-              <a:t> </a:t>
-            </a:r>
-            <a:r>
-              <a:rPr lang="de-DE" dirty="0" err="1"/>
-              <a:t>created</a:t>
-            </a:r>
-            <a:r>
-              <a:rPr lang="de-DE" dirty="0"/>
-              <a:t> </a:t>
-            </a:r>
-            <a:r>
-              <a:rPr lang="de-DE" dirty="0" err="1" smtClean="0"/>
-              <a:t>pseudonyms</a:t>
-            </a:r>
-            <a:endParaRPr lang="de-DE" dirty="0" smtClean="0"/>
-          </a:p>
-          <a:p>
-            <a:pPr marL="457200" indent="-457200">
-              <a:buFont typeface="+mj-lt"/>
-              <a:buAutoNum type="arabicPeriod"/>
-            </a:pPr>
-            <a:r>
-              <a:rPr lang="de-DE" dirty="0" smtClean="0"/>
-              <a:t>Evaluation</a:t>
-            </a:r>
-          </a:p>
-          <a:p>
-            <a:pPr marL="457200" indent="-457200">
-              <a:buFont typeface="+mj-lt"/>
-              <a:buAutoNum type="arabicPeriod"/>
-            </a:pPr>
-            <a:r>
-              <a:rPr lang="de-DE" dirty="0" err="1" smtClean="0"/>
-              <a:t>Conclusion</a:t>
-            </a:r>
-            <a:endParaRPr lang="de-DE" dirty="0" smtClean="0"/>
-          </a:p>
-          <a:p>
-            <a:pPr marL="457200" indent="-457200">
-              <a:buFont typeface="+mj-lt"/>
-              <a:buAutoNum type="arabicPeriod"/>
-            </a:pPr>
-            <a:endParaRPr lang="de-DE" dirty="0"/>
-          </a:p>
-        </p:txBody>
-      </p:sp>
-    </p:spTree>
-    <p:extLst>
-      <p:ext uri="{BB962C8B-B14F-4D97-AF65-F5344CB8AC3E}">
-        <p14:creationId xmlns:p14="http://schemas.microsoft.com/office/powerpoint/2010/main" val="3481102364"/>
-      </p:ext>
-    </p:extLst>
-  </p:cSld>
-  <p:clrMapOvr>
-    <a:masterClrMapping/>
-  </p:clrMapOvr>
-</p:sld>
-</file>
-
-<file path=ppt/slides/slide4.xml><?xml version="1.0" encoding="utf-8"?>
-<p:sld xmlns:a="http://schemas.openxmlformats.org/drawingml/2006/main" xmlns:r="http://schemas.openxmlformats.org/officeDocument/2006/relationships" xmlns:p="http://schemas.openxmlformats.org/presentationml/2006/main">
-  <p:cSld>
-    <p:spTree>
-      <p:nvGrpSpPr>
-        <p:cNvPr id="1" name=""/>
-        <p:cNvGrpSpPr/>
-        <p:nvPr/>
-      </p:nvGrpSpPr>
-      <p:grpSpPr>
-        <a:xfrm>
-          <a:off x="0" y="0"/>
-          <a:ext cx="0" cy="0"/>
-          <a:chOff x="0" y="0"/>
-          <a:chExt cx="0" cy="0"/>
-        </a:xfrm>
-      </p:grpSpPr>
-      <p:sp>
-        <p:nvSpPr>
-          <p:cNvPr id="2" name="Titel 1"/>
-          <p:cNvSpPr>
-            <a:spLocks noGrp="1"/>
-          </p:cNvSpPr>
-          <p:nvPr>
-            <p:ph type="title"/>
-          </p:nvPr>
-        </p:nvSpPr>
-        <p:spPr/>
-        <p:txBody>
-          <a:bodyPr/>
-          <a:lstStyle/>
-          <a:p>
-            <a:r>
               <a:rPr lang="de-DE" dirty="0"/>
               <a:t>Insider </a:t>
             </a:r>
@@ -6942,7 +6739,7 @@
               </a14:hiddenLine>
             </a:ext>
             <a:ext uri="{FAA26D3D-D897-4be2-8F04-BA451C77F1D7}">
-              <ma14:placeholderFlag xmlns="" xmlns:ma14="http://schemas.microsoft.com/office/mac/drawingml/2011/main" val="1"/>
+              <ma14:placeholderFlag xmlns:ma14="http://schemas.microsoft.com/office/mac/drawingml/2011/main" xmlns="" val="1"/>
             </a:ext>
           </a:extLst>
         </p:spPr>
@@ -7936,7 +7733,7 @@
 </p:sld>
 </file>
 
-<file path=ppt/slides/slide5.xml><?xml version="1.0" encoding="utf-8"?>
+<file path=ppt/slides/slide4.xml><?xml version="1.0" encoding="utf-8"?>
 <p:sld xmlns:a="http://schemas.openxmlformats.org/drawingml/2006/main" xmlns:r="http://schemas.openxmlformats.org/officeDocument/2006/relationships" xmlns:p="http://schemas.openxmlformats.org/presentationml/2006/main">
   <p:cSld>
     <p:spTree>
@@ -8429,7 +8226,7 @@
                 </a14:hiddenLine>
               </a:ext>
               <a:ext uri="{FAA26D3D-D897-4be2-8F04-BA451C77F1D7}">
-                <ma14:placeholderFlag xmlns="" xmlns:ma14="http://schemas.microsoft.com/office/mac/drawingml/2011/main" val="1"/>
+                <ma14:placeholderFlag xmlns:ma14="http://schemas.microsoft.com/office/mac/drawingml/2011/main" xmlns="" val="1"/>
               </a:ext>
             </a:extLst>
           </p:spPr>
@@ -8659,7 +8456,7 @@
               </a14:hiddenLine>
             </a:ext>
             <a:ext uri="{FAA26D3D-D897-4be2-8F04-BA451C77F1D7}">
-              <ma14:placeholderFlag xmlns="" xmlns:ma14="http://schemas.microsoft.com/office/mac/drawingml/2011/main" val="1"/>
+              <ma14:placeholderFlag xmlns:ma14="http://schemas.microsoft.com/office/mac/drawingml/2011/main" xmlns="" val="1"/>
             </a:ext>
           </a:extLst>
         </p:spPr>
@@ -8835,11 +8632,7 @@
             </a:pPr>
             <a:r>
               <a:rPr lang="de-DE" kern="0" dirty="0" smtClean="0"/>
-              <a:t>§32 </a:t>
-            </a:r>
-            <a:r>
-              <a:rPr lang="de-DE" kern="0" dirty="0" smtClean="0"/>
-              <a:t>BDSG</a:t>
+              <a:t>§32 BDSG</a:t>
             </a:r>
           </a:p>
           <a:p>
@@ -8988,7 +8781,7 @@
 </p:sld>
 </file>
 
-<file path=ppt/slides/slide6.xml><?xml version="1.0" encoding="utf-8"?>
+<file path=ppt/slides/slide5.xml><?xml version="1.0" encoding="utf-8"?>
 <p:sld xmlns:a="http://schemas.openxmlformats.org/drawingml/2006/main" xmlns:r="http://schemas.openxmlformats.org/officeDocument/2006/relationships" xmlns:p="http://schemas.openxmlformats.org/presentationml/2006/main">
   <p:cSld>
     <p:spTree>
@@ -9027,7 +8820,7 @@
           </a:ln>
           <a:extLst>
             <a:ext uri="{FAA26D3D-D897-4be2-8F04-BA451C77F1D7}">
-              <ma14:placeholderFlag xmlns="" xmlns:ma14="http://schemas.microsoft.com/office/mac/drawingml/2011/main" val="1"/>
+              <ma14:placeholderFlag xmlns:ma14="http://schemas.microsoft.com/office/mac/drawingml/2011/main" xmlns="" val="1"/>
             </a:ext>
           </a:extLst>
         </p:spPr>
@@ -9443,7 +9236,7 @@
           </a:ln>
           <a:extLst>
             <a:ext uri="{FAA26D3D-D897-4be2-8F04-BA451C77F1D7}">
-              <ma14:placeholderFlag xmlns="" xmlns:ma14="http://schemas.microsoft.com/office/mac/drawingml/2011/main" val="1"/>
+              <ma14:placeholderFlag xmlns:ma14="http://schemas.microsoft.com/office/mac/drawingml/2011/main" xmlns="" val="1"/>
             </a:ext>
           </a:extLst>
         </p:spPr>
@@ -9913,6 +9706,99 @@
 </p:sld>
 </file>
 
+<file path=ppt/slides/slide6.xml><?xml version="1.0" encoding="utf-8"?>
+<p:sld xmlns:a="http://schemas.openxmlformats.org/drawingml/2006/main" xmlns:r="http://schemas.openxmlformats.org/officeDocument/2006/relationships" xmlns:p="http://schemas.openxmlformats.org/presentationml/2006/main">
+  <p:cSld>
+    <p:spTree>
+      <p:nvGrpSpPr>
+        <p:cNvPr id="1" name=""/>
+        <p:cNvGrpSpPr/>
+        <p:nvPr/>
+      </p:nvGrpSpPr>
+      <p:grpSpPr>
+        <a:xfrm>
+          <a:off x="0" y="0"/>
+          <a:ext cx="0" cy="0"/>
+          <a:chOff x="0" y="0"/>
+          <a:chExt cx="0" cy="0"/>
+        </a:xfrm>
+      </p:grpSpPr>
+      <p:sp>
+        <p:nvSpPr>
+          <p:cNvPr id="2" name="Titel 1"/>
+          <p:cNvSpPr>
+            <a:spLocks noGrp="1"/>
+          </p:cNvSpPr>
+          <p:nvPr>
+            <p:ph type="title"/>
+          </p:nvPr>
+        </p:nvSpPr>
+        <p:spPr/>
+        <p:txBody>
+          <a:bodyPr/>
+          <a:lstStyle/>
+          <a:p>
+            <a:r>
+              <a:rPr lang="de-DE" dirty="0" smtClean="0"/>
+              <a:t>Approach (II)</a:t>
+            </a:r>
+            <a:endParaRPr lang="de-DE" dirty="0"/>
+          </a:p>
+        </p:txBody>
+      </p:sp>
+      <p:pic>
+        <p:nvPicPr>
+          <p:cNvPr id="15363" name="Picture 3"/>
+          <p:cNvPicPr>
+            <a:picLocks noChangeAspect="1" noChangeArrowheads="1"/>
+          </p:cNvPicPr>
+          <p:nvPr/>
+        </p:nvPicPr>
+        <p:blipFill>
+          <a:blip r:embed="rId2">
+            <a:extLst>
+              <a:ext uri="{28A0092B-C50C-407E-A947-70E740481C1C}">
+                <a14:useLocalDpi xmlns:a14="http://schemas.microsoft.com/office/drawing/2010/main" val="0"/>
+              </a:ext>
+            </a:extLst>
+          </a:blip>
+          <a:stretch>
+            <a:fillRect/>
+          </a:stretch>
+        </p:blipFill>
+        <p:spPr bwMode="auto">
+          <a:xfrm>
+            <a:off x="755576" y="1414091"/>
+            <a:ext cx="7962652" cy="5113027"/>
+          </a:xfrm>
+          <a:prstGeom prst="rect">
+            <a:avLst/>
+          </a:prstGeom>
+          <a:noFill/>
+          <a:extLst>
+            <a:ext uri="{909E8E84-426E-40DD-AFC4-6F175D3DCCD1}">
+              <a14:hiddenFill xmlns:a14="http://schemas.microsoft.com/office/drawing/2010/main">
+                <a:solidFill>
+                  <a:srgbClr val="FFFFFF"/>
+                </a:solidFill>
+              </a14:hiddenFill>
+            </a:ext>
+          </a:extLst>
+        </p:spPr>
+      </p:pic>
+    </p:spTree>
+    <p:extLst>
+      <p:ext uri="{BB962C8B-B14F-4D97-AF65-F5344CB8AC3E}">
+        <p14:creationId xmlns:p14="http://schemas.microsoft.com/office/powerpoint/2010/main" val="1268790526"/>
+      </p:ext>
+    </p:extLst>
+  </p:cSld>
+  <p:clrMapOvr>
+    <a:masterClrMapping/>
+  </p:clrMapOvr>
+</p:sld>
+</file>
+
 <file path=ppt/slides/slide7.xml><?xml version="1.0" encoding="utf-8"?>
 <p:sld xmlns:a="http://schemas.openxmlformats.org/drawingml/2006/main" xmlns:r="http://schemas.openxmlformats.org/officeDocument/2006/relationships" xmlns:p="http://schemas.openxmlformats.org/presentationml/2006/main">
   <p:cSld>
@@ -9946,8 +9832,12 @@
           <a:lstStyle/>
           <a:p>
             <a:r>
-              <a:rPr lang="de-DE" dirty="0" smtClean="0"/>
-              <a:t>Approach (II)</a:t>
+              <a:rPr lang="de-DE" dirty="0" err="1" smtClean="0"/>
+              <a:t>Conceptual</a:t>
+            </a:r>
+            <a:r>
+              <a:rPr lang="de-DE" dirty="0" smtClean="0"/>
+              <a:t> design</a:t>
             </a:r>
             <a:endParaRPr lang="de-DE" dirty="0"/>
           </a:p>
@@ -9955,7 +9845,7 @@
       </p:sp>
       <p:pic>
         <p:nvPicPr>
-          <p:cNvPr id="15363" name="Picture 3" descr="C:\Users\m3\Entwicklung\git\master-thesis\thesis\dia\overview.png"/>
+          <p:cNvPr id="16386" name="Picture 2"/>
           <p:cNvPicPr>
             <a:picLocks noChangeAspect="1" noChangeArrowheads="1"/>
           </p:cNvPicPr>
@@ -9969,113 +9859,14 @@
               </a:ext>
             </a:extLst>
           </a:blip>
-          <a:srcRect/>
           <a:stretch>
             <a:fillRect/>
           </a:stretch>
         </p:blipFill>
         <p:spPr bwMode="auto">
           <a:xfrm>
-            <a:off x="755576" y="1412776"/>
-            <a:ext cx="7962652" cy="5115657"/>
-          </a:xfrm>
-          <a:prstGeom prst="rect">
-            <a:avLst/>
-          </a:prstGeom>
-          <a:noFill/>
-          <a:extLst>
-            <a:ext uri="{909E8E84-426E-40DD-AFC4-6F175D3DCCD1}">
-              <a14:hiddenFill xmlns:a14="http://schemas.microsoft.com/office/drawing/2010/main">
-                <a:solidFill>
-                  <a:srgbClr val="FFFFFF"/>
-                </a:solidFill>
-              </a14:hiddenFill>
-            </a:ext>
-          </a:extLst>
-        </p:spPr>
-      </p:pic>
-    </p:spTree>
-    <p:extLst>
-      <p:ext uri="{BB962C8B-B14F-4D97-AF65-F5344CB8AC3E}">
-        <p14:creationId xmlns:p14="http://schemas.microsoft.com/office/powerpoint/2010/main" val="1268790526"/>
-      </p:ext>
-    </p:extLst>
-  </p:cSld>
-  <p:clrMapOvr>
-    <a:masterClrMapping/>
-  </p:clrMapOvr>
-</p:sld>
-</file>
-
-<file path=ppt/slides/slide8.xml><?xml version="1.0" encoding="utf-8"?>
-<p:sld xmlns:a="http://schemas.openxmlformats.org/drawingml/2006/main" xmlns:r="http://schemas.openxmlformats.org/officeDocument/2006/relationships" xmlns:p="http://schemas.openxmlformats.org/presentationml/2006/main">
-  <p:cSld>
-    <p:spTree>
-      <p:nvGrpSpPr>
-        <p:cNvPr id="1" name=""/>
-        <p:cNvGrpSpPr/>
-        <p:nvPr/>
-      </p:nvGrpSpPr>
-      <p:grpSpPr>
-        <a:xfrm>
-          <a:off x="0" y="0"/>
-          <a:ext cx="0" cy="0"/>
-          <a:chOff x="0" y="0"/>
-          <a:chExt cx="0" cy="0"/>
-        </a:xfrm>
-      </p:grpSpPr>
-      <p:sp>
-        <p:nvSpPr>
-          <p:cNvPr id="2" name="Titel 1"/>
-          <p:cNvSpPr>
-            <a:spLocks noGrp="1"/>
-          </p:cNvSpPr>
-          <p:nvPr>
-            <p:ph type="title"/>
-          </p:nvPr>
-        </p:nvSpPr>
-        <p:spPr/>
-        <p:txBody>
-          <a:bodyPr/>
-          <a:lstStyle/>
-          <a:p>
-            <a:r>
-              <a:rPr lang="de-DE" dirty="0" err="1" smtClean="0"/>
-              <a:t>Conceptual</a:t>
-            </a:r>
-            <a:r>
-              <a:rPr lang="de-DE" dirty="0" smtClean="0"/>
-              <a:t> design</a:t>
-            </a:r>
-            <a:endParaRPr lang="de-DE" dirty="0"/>
-          </a:p>
-        </p:txBody>
-      </p:sp>
-      <p:pic>
-        <p:nvPicPr>
-          <p:cNvPr id="16386" name="Picture 2" descr="C:\Users\m3\Entwicklung\git\master-thesis\thesis\dia\high_level_architecture.png"/>
-          <p:cNvPicPr>
-            <a:picLocks noChangeAspect="1" noChangeArrowheads="1"/>
-          </p:cNvPicPr>
-          <p:nvPr/>
-        </p:nvPicPr>
-        <p:blipFill>
-          <a:blip r:embed="rId2">
-            <a:extLst>
-              <a:ext uri="{28A0092B-C50C-407E-A947-70E740481C1C}">
-                <a14:useLocalDpi xmlns:a14="http://schemas.microsoft.com/office/drawing/2010/main" val="0"/>
-              </a:ext>
-            </a:extLst>
-          </a:blip>
-          <a:srcRect/>
-          <a:stretch>
-            <a:fillRect/>
-          </a:stretch>
-        </p:blipFill>
-        <p:spPr bwMode="auto">
-          <a:xfrm>
-            <a:off x="395536" y="1628800"/>
-            <a:ext cx="8397216" cy="4032448"/>
+            <a:off x="413522" y="1628800"/>
+            <a:ext cx="8361243" cy="4032448"/>
           </a:xfrm>
           <a:prstGeom prst="rect">
             <a:avLst/>
@@ -10105,7 +9896,7 @@
 </p:sld>
 </file>
 
-<file path=ppt/slides/slide9.xml><?xml version="1.0" encoding="utf-8"?>
+<file path=ppt/slides/slide8.xml><?xml version="1.0" encoding="utf-8"?>
 <p:sld xmlns:a="http://schemas.openxmlformats.org/drawingml/2006/main" xmlns:r="http://schemas.openxmlformats.org/officeDocument/2006/relationships" xmlns:p="http://schemas.openxmlformats.org/presentationml/2006/main">
   <p:cSld>
     <p:spTree>
@@ -10144,7 +9935,7 @@
           </a:ln>
           <a:extLst>
             <a:ext uri="{FAA26D3D-D897-4be2-8F04-BA451C77F1D7}">
-              <ma14:placeholderFlag xmlns="" xmlns:ma14="http://schemas.microsoft.com/office/mac/drawingml/2011/main" val="1"/>
+              <ma14:placeholderFlag xmlns:ma14="http://schemas.microsoft.com/office/mac/drawingml/2011/main" xmlns="" val="1"/>
             </a:ext>
           </a:extLst>
         </p:spPr>
@@ -10599,7 +10390,7 @@
           </a:ln>
           <a:extLst>
             <a:ext uri="{FAA26D3D-D897-4be2-8F04-BA451C77F1D7}">
-              <ma14:placeholderFlag xmlns="" xmlns:ma14="http://schemas.microsoft.com/office/mac/drawingml/2011/main" val="1"/>
+              <ma14:placeholderFlag xmlns:ma14="http://schemas.microsoft.com/office/mac/drawingml/2011/main" xmlns="" val="1"/>
             </a:ext>
           </a:extLst>
         </p:spPr>
@@ -10987,6 +10778,204 @@
     <p:extLst>
       <p:ext uri="{BB962C8B-B14F-4D97-AF65-F5344CB8AC3E}">
         <p14:creationId xmlns:p14="http://schemas.microsoft.com/office/powerpoint/2010/main" val="865240146"/>
+      </p:ext>
+    </p:extLst>
+  </p:cSld>
+  <p:clrMapOvr>
+    <a:masterClrMapping/>
+  </p:clrMapOvr>
+</p:sld>
+</file>
+
+<file path=ppt/slides/slide9.xml><?xml version="1.0" encoding="utf-8"?>
+<p:sld xmlns:a="http://schemas.openxmlformats.org/drawingml/2006/main" xmlns:r="http://schemas.openxmlformats.org/officeDocument/2006/relationships" xmlns:p="http://schemas.openxmlformats.org/presentationml/2006/main">
+  <p:cSld>
+    <p:spTree>
+      <p:nvGrpSpPr>
+        <p:cNvPr id="1" name=""/>
+        <p:cNvGrpSpPr/>
+        <p:nvPr/>
+      </p:nvGrpSpPr>
+      <p:grpSpPr>
+        <a:xfrm>
+          <a:off x="0" y="0"/>
+          <a:ext cx="0" cy="0"/>
+          <a:chOff x="0" y="0"/>
+          <a:chExt cx="0" cy="0"/>
+        </a:xfrm>
+      </p:grpSpPr>
+      <p:sp>
+        <p:nvSpPr>
+          <p:cNvPr id="2" name="Titel 1"/>
+          <p:cNvSpPr>
+            <a:spLocks noGrp="1"/>
+          </p:cNvSpPr>
+          <p:nvPr>
+            <p:ph type="title"/>
+          </p:nvPr>
+        </p:nvSpPr>
+        <p:spPr/>
+        <p:txBody>
+          <a:bodyPr/>
+          <a:lstStyle/>
+          <a:p>
+            <a:r>
+              <a:rPr lang="de-DE" dirty="0" err="1" smtClean="0"/>
+              <a:t>Identifying</a:t>
+            </a:r>
+            <a:r>
+              <a:rPr lang="de-DE" dirty="0" smtClean="0"/>
+              <a:t> </a:t>
+            </a:r>
+            <a:r>
+              <a:rPr lang="de-DE" dirty="0" err="1" smtClean="0"/>
+              <a:t>created</a:t>
+            </a:r>
+            <a:r>
+              <a:rPr lang="de-DE" dirty="0" smtClean="0"/>
+              <a:t> </a:t>
+            </a:r>
+            <a:r>
+              <a:rPr lang="de-DE" dirty="0" err="1" smtClean="0"/>
+              <a:t>pseudonyms</a:t>
+            </a:r>
+            <a:endParaRPr lang="de-DE" dirty="0"/>
+          </a:p>
+        </p:txBody>
+      </p:sp>
+      <p:sp>
+        <p:nvSpPr>
+          <p:cNvPr id="3" name="Inhaltsplatzhalter 2"/>
+          <p:cNvSpPr>
+            <a:spLocks noGrp="1"/>
+          </p:cNvSpPr>
+          <p:nvPr>
+            <p:ph idx="1"/>
+          </p:nvPr>
+        </p:nvSpPr>
+        <p:spPr>
+          <a:xfrm>
+            <a:off x="3023828" y="4040832"/>
+            <a:ext cx="3096344" cy="2484512"/>
+          </a:xfrm>
+        </p:spPr>
+        <p:txBody>
+          <a:bodyPr/>
+          <a:lstStyle/>
+          <a:p>
+            <a:r>
+              <a:rPr lang="de-DE" dirty="0" err="1"/>
+              <a:t>Local</a:t>
+            </a:r>
+            <a:r>
+              <a:rPr lang="de-DE" dirty="0"/>
+              <a:t> </a:t>
+            </a:r>
+            <a:r>
+              <a:rPr lang="de-DE" dirty="0" err="1" smtClean="0"/>
+              <a:t>storage</a:t>
+            </a:r>
+            <a:endParaRPr lang="de-DE" strike="sngStrike" dirty="0" smtClean="0"/>
+          </a:p>
+          <a:p>
+            <a:r>
+              <a:rPr lang="de-DE" strike="sngStrike" dirty="0" err="1" smtClean="0"/>
+              <a:t>Decryption</a:t>
+            </a:r>
+            <a:endParaRPr lang="de-DE" strike="sngStrike" dirty="0" smtClean="0"/>
+          </a:p>
+          <a:p>
+            <a:r>
+              <a:rPr lang="de-DE" strike="sngStrike" dirty="0" err="1" smtClean="0"/>
+              <a:t>Deterministic</a:t>
+            </a:r>
+            <a:r>
+              <a:rPr lang="de-DE" strike="sngStrike" dirty="0" smtClean="0"/>
+              <a:t> </a:t>
+            </a:r>
+            <a:r>
+              <a:rPr lang="de-DE" strike="sngStrike" dirty="0" err="1" smtClean="0"/>
+              <a:t>encryption</a:t>
+            </a:r>
+            <a:endParaRPr lang="de-DE" strike="sngStrike" dirty="0"/>
+          </a:p>
+          <a:p>
+            <a:r>
+              <a:rPr lang="de-DE" strike="sngStrike" dirty="0" err="1" smtClean="0"/>
+              <a:t>Hashing</a:t>
+            </a:r>
+            <a:endParaRPr lang="de-DE" strike="sngStrike" dirty="0" smtClean="0"/>
+          </a:p>
+          <a:p>
+            <a:r>
+              <a:rPr lang="de-DE" b="1" dirty="0" smtClean="0"/>
+              <a:t>MACs</a:t>
+            </a:r>
+          </a:p>
+          <a:p>
+            <a:r>
+              <a:rPr lang="de-DE" dirty="0" err="1" smtClean="0"/>
+              <a:t>Searchable</a:t>
+            </a:r>
+            <a:r>
+              <a:rPr lang="de-DE" dirty="0" smtClean="0"/>
+              <a:t> </a:t>
+            </a:r>
+            <a:r>
+              <a:rPr lang="de-DE" dirty="0" err="1" smtClean="0"/>
+              <a:t>encryption</a:t>
+            </a:r>
+            <a:endParaRPr lang="de-DE" dirty="0" smtClean="0"/>
+          </a:p>
+          <a:p>
+            <a:endParaRPr lang="de-DE" dirty="0"/>
+          </a:p>
+        </p:txBody>
+      </p:sp>
+      <p:pic>
+        <p:nvPicPr>
+          <p:cNvPr id="17410" name="Picture 2"/>
+          <p:cNvPicPr>
+            <a:picLocks noChangeAspect="1" noChangeArrowheads="1"/>
+          </p:cNvPicPr>
+          <p:nvPr/>
+        </p:nvPicPr>
+        <p:blipFill>
+          <a:blip r:embed="rId2">
+            <a:extLst>
+              <a:ext uri="{28A0092B-C50C-407E-A947-70E740481C1C}">
+                <a14:useLocalDpi xmlns:a14="http://schemas.microsoft.com/office/drawing/2010/main" val="0"/>
+              </a:ext>
+            </a:extLst>
+          </a:blip>
+          <a:stretch>
+            <a:fillRect/>
+          </a:stretch>
+        </p:blipFill>
+        <p:spPr bwMode="auto">
+          <a:xfrm>
+            <a:off x="1554522" y="1632135"/>
+            <a:ext cx="6034956" cy="2260129"/>
+          </a:xfrm>
+          <a:prstGeom prst="rect">
+            <a:avLst/>
+          </a:prstGeom>
+          <a:noFill/>
+          <a:extLst>
+            <a:ext uri="{909E8E84-426E-40DD-AFC4-6F175D3DCCD1}">
+              <a14:hiddenFill xmlns:a14="http://schemas.microsoft.com/office/drawing/2010/main">
+                <a:solidFill>
+                  <a:srgbClr val="FFFFFF"/>
+                </a:solidFill>
+              </a14:hiddenFill>
+            </a:ext>
+          </a:extLst>
+        </p:spPr>
+      </p:pic>
+    </p:spTree>
+    <p:extLst>
+      <p:ext uri="{BB962C8B-B14F-4D97-AF65-F5344CB8AC3E}">
+        <p14:creationId xmlns:p14="http://schemas.microsoft.com/office/powerpoint/2010/main" val="3862439232"/>
       </p:ext>
     </p:extLst>
   </p:cSld>

</xml_diff>